<commit_message>
add: Folders for data and results
</commit_message>
<xml_diff>
--- a/FinalProject.pptx
+++ b/FinalProject.pptx
@@ -5,22 +5,24 @@
     <p:sldMasterId id="2147483768" r:id="rId1"/>
   </p:sldMasterIdLst>
   <p:notesMasterIdLst>
-    <p:notesMasterId r:id="rId15"/>
+    <p:notesMasterId r:id="rId17"/>
   </p:notesMasterIdLst>
   <p:sldIdLst>
     <p:sldId id="256" r:id="rId2"/>
     <p:sldId id="276" r:id="rId3"/>
-    <p:sldId id="282" r:id="rId4"/>
-    <p:sldId id="283" r:id="rId5"/>
-    <p:sldId id="286" r:id="rId6"/>
+    <p:sldId id="286" r:id="rId4"/>
+    <p:sldId id="282" r:id="rId5"/>
+    <p:sldId id="283" r:id="rId6"/>
     <p:sldId id="268" r:id="rId7"/>
     <p:sldId id="281" r:id="rId8"/>
     <p:sldId id="269" r:id="rId9"/>
     <p:sldId id="284" r:id="rId10"/>
     <p:sldId id="279" r:id="rId11"/>
-    <p:sldId id="285" r:id="rId12"/>
-    <p:sldId id="287" r:id="rId13"/>
-    <p:sldId id="267" r:id="rId14"/>
+    <p:sldId id="288" r:id="rId12"/>
+    <p:sldId id="285" r:id="rId13"/>
+    <p:sldId id="287" r:id="rId14"/>
+    <p:sldId id="289" r:id="rId15"/>
+    <p:sldId id="267" r:id="rId16"/>
   </p:sldIdLst>
   <p:sldSz cx="12192000" cy="6858000"/>
   <p:notesSz cx="6858000" cy="9144000"/>
@@ -3125,7 +3127,7 @@
           <a:p>
             <a:fld id="{3BA5CC3D-6975-4F0F-8598-1B548BCD788E}" type="datetimeFigureOut">
               <a:rPr lang="en-US" smtClean="0"/>
-              <a:t>1/1/2023</a:t>
+              <a:t>1/8/2023</a:t>
             </a:fld>
             <a:endParaRPr lang="en-US"/>
           </a:p>
@@ -3630,7 +3632,7 @@
           <a:p>
             <a:fld id="{C1B1FAC4-5B07-4156-89F3-088CF1BAFAF8}" type="slidenum">
               <a:rPr lang="en-US" smtClean="0"/>
-              <a:t>3</a:t>
+              <a:t>4</a:t>
             </a:fld>
             <a:endParaRPr lang="en-US"/>
           </a:p>
@@ -3715,7 +3717,7 @@
           <a:p>
             <a:fld id="{C1B1FAC4-5B07-4156-89F3-088CF1BAFAF8}" type="slidenum">
               <a:rPr lang="en-US" smtClean="0"/>
-              <a:t>4</a:t>
+              <a:t>5</a:t>
             </a:fld>
             <a:endParaRPr lang="en-US"/>
           </a:p>
@@ -4132,7 +4134,7 @@
           <a:p>
             <a:fld id="{CC081872-FAAB-4301-B55B-02C804570609}" type="datetimeFigureOut">
               <a:rPr lang="en-US" smtClean="0"/>
-              <a:t>1/1/2023</a:t>
+              <a:t>1/8/2023</a:t>
             </a:fld>
             <a:endParaRPr lang="en-US"/>
           </a:p>
@@ -4466,7 +4468,7 @@
           <a:p>
             <a:fld id="{CC081872-FAAB-4301-B55B-02C804570609}" type="datetimeFigureOut">
               <a:rPr lang="en-US" smtClean="0"/>
-              <a:t>1/1/2023</a:t>
+              <a:t>1/8/2023</a:t>
             </a:fld>
             <a:endParaRPr lang="en-US"/>
           </a:p>
@@ -4744,7 +4746,7 @@
           <a:p>
             <a:fld id="{CC081872-FAAB-4301-B55B-02C804570609}" type="datetimeFigureOut">
               <a:rPr lang="en-US" smtClean="0"/>
-              <a:t>1/1/2023</a:t>
+              <a:t>1/8/2023</a:t>
             </a:fld>
             <a:endParaRPr lang="en-US"/>
           </a:p>
@@ -5312,7 +5314,7 @@
           <a:p>
             <a:fld id="{CC081872-FAAB-4301-B55B-02C804570609}" type="datetimeFigureOut">
               <a:rPr lang="en-US" smtClean="0"/>
-              <a:t>1/1/2023</a:t>
+              <a:t>1/8/2023</a:t>
             </a:fld>
             <a:endParaRPr lang="en-US"/>
           </a:p>
@@ -5590,7 +5592,7 @@
           <a:p>
             <a:fld id="{CC081872-FAAB-4301-B55B-02C804570609}" type="datetimeFigureOut">
               <a:rPr lang="en-US" smtClean="0"/>
-              <a:t>1/1/2023</a:t>
+              <a:t>1/8/2023</a:t>
             </a:fld>
             <a:endParaRPr lang="en-US"/>
           </a:p>
@@ -6152,7 +6154,7 @@
           <a:p>
             <a:fld id="{CC081872-FAAB-4301-B55B-02C804570609}" type="datetimeFigureOut">
               <a:rPr lang="en-US" smtClean="0"/>
-              <a:t>1/1/2023</a:t>
+              <a:t>1/8/2023</a:t>
             </a:fld>
             <a:endParaRPr lang="en-US"/>
           </a:p>
@@ -6479,7 +6481,7 @@
           <a:p>
             <a:fld id="{CC081872-FAAB-4301-B55B-02C804570609}" type="datetimeFigureOut">
               <a:rPr lang="en-US" smtClean="0"/>
-              <a:t>1/1/2023</a:t>
+              <a:t>1/8/2023</a:t>
             </a:fld>
             <a:endParaRPr lang="en-US"/>
           </a:p>
@@ -6656,7 +6658,7 @@
           <a:p>
             <a:fld id="{CC081872-FAAB-4301-B55B-02C804570609}" type="datetimeFigureOut">
               <a:rPr lang="en-US" smtClean="0"/>
-              <a:t>1/1/2023</a:t>
+              <a:t>1/8/2023</a:t>
             </a:fld>
             <a:endParaRPr lang="en-US"/>
           </a:p>
@@ -6894,7 +6896,7 @@
           <a:p>
             <a:fld id="{CC081872-FAAB-4301-B55B-02C804570609}" type="datetimeFigureOut">
               <a:rPr lang="en-US" smtClean="0"/>
-              <a:t>1/1/2023</a:t>
+              <a:t>1/8/2023</a:t>
             </a:fld>
             <a:endParaRPr lang="en-US"/>
           </a:p>
@@ -7094,7 +7096,7 @@
           <a:p>
             <a:fld id="{CC081872-FAAB-4301-B55B-02C804570609}" type="datetimeFigureOut">
               <a:rPr lang="en-US" smtClean="0"/>
-              <a:t>1/1/2023</a:t>
+              <a:t>1/8/2023</a:t>
             </a:fld>
             <a:endParaRPr lang="en-US"/>
           </a:p>
@@ -7370,7 +7372,7 @@
           <a:p>
             <a:fld id="{CC081872-FAAB-4301-B55B-02C804570609}" type="datetimeFigureOut">
               <a:rPr lang="en-US" smtClean="0"/>
-              <a:t>1/1/2023</a:t>
+              <a:t>1/8/2023</a:t>
             </a:fld>
             <a:endParaRPr lang="en-US"/>
           </a:p>
@@ -7636,7 +7638,7 @@
           <a:p>
             <a:fld id="{CC081872-FAAB-4301-B55B-02C804570609}" type="datetimeFigureOut">
               <a:rPr lang="en-US" smtClean="0"/>
-              <a:t>1/1/2023</a:t>
+              <a:t>1/8/2023</a:t>
             </a:fld>
             <a:endParaRPr lang="en-US"/>
           </a:p>
@@ -8010,7 +8012,7 @@
           <a:p>
             <a:fld id="{CC081872-FAAB-4301-B55B-02C804570609}" type="datetimeFigureOut">
               <a:rPr lang="en-US" smtClean="0"/>
-              <a:t>1/1/2023</a:t>
+              <a:t>1/8/2023</a:t>
             </a:fld>
             <a:endParaRPr lang="en-US"/>
           </a:p>
@@ -8158,7 +8160,7 @@
           <a:p>
             <a:fld id="{CC081872-FAAB-4301-B55B-02C804570609}" type="datetimeFigureOut">
               <a:rPr lang="en-US" smtClean="0"/>
-              <a:t>1/1/2023</a:t>
+              <a:t>1/8/2023</a:t>
             </a:fld>
             <a:endParaRPr lang="en-US"/>
           </a:p>
@@ -8283,7 +8285,7 @@
           <a:p>
             <a:fld id="{CC081872-FAAB-4301-B55B-02C804570609}" type="datetimeFigureOut">
               <a:rPr lang="en-US" smtClean="0"/>
-              <a:t>1/1/2023</a:t>
+              <a:t>1/8/2023</a:t>
             </a:fld>
             <a:endParaRPr lang="en-US"/>
           </a:p>
@@ -8568,7 +8570,7 @@
           <a:p>
             <a:fld id="{CC081872-FAAB-4301-B55B-02C804570609}" type="datetimeFigureOut">
               <a:rPr lang="en-US" smtClean="0"/>
-              <a:t>1/1/2023</a:t>
+              <a:t>1/8/2023</a:t>
             </a:fld>
             <a:endParaRPr lang="en-US"/>
           </a:p>
@@ -8892,7 +8894,7 @@
           <a:p>
             <a:fld id="{CC081872-FAAB-4301-B55B-02C804570609}" type="datetimeFigureOut">
               <a:rPr lang="en-US" smtClean="0"/>
-              <a:t>1/1/2023</a:t>
+              <a:t>1/8/2023</a:t>
             </a:fld>
             <a:endParaRPr lang="en-US"/>
           </a:p>
@@ -9106,7 +9108,7 @@
           <a:p>
             <a:fld id="{CC081872-FAAB-4301-B55B-02C804570609}" type="datetimeFigureOut">
               <a:rPr lang="en-US" smtClean="0"/>
-              <a:t>1/1/2023</a:t>
+              <a:t>1/8/2023</a:t>
             </a:fld>
             <a:endParaRPr lang="en-US"/>
           </a:p>
@@ -9774,13 +9776,6 @@
   <p:clrMapOvr>
     <a:masterClrMapping/>
   </p:clrMapOvr>
-  <p:timing>
-    <p:tnLst>
-      <p:par>
-        <p:cTn id="1" dur="indefinite" restart="never" nodeType="tmRoot"/>
-      </p:par>
-    </p:tnLst>
-  </p:timing>
 </p:sld>
 </file>
 
@@ -9926,8 +9921,8 @@
         </p:nvSpPr>
         <p:spPr>
           <a:xfrm>
-            <a:off x="4916559" y="2063538"/>
-            <a:ext cx="2358881" cy="738664"/>
+            <a:off x="4643714" y="2221079"/>
+            <a:ext cx="2358881" cy="307777"/>
           </a:xfrm>
           <a:prstGeom prst="rect">
             <a:avLst/>
@@ -9941,30 +9936,20 @@
           <a:p>
             <a:pPr algn="l" rtl="0"/>
             <a:r>
+              <a:rPr lang="en-US" sz="1400" b="0" dirty="0" err="1">
+                <a:effectLst/>
+                <a:latin typeface="Times New Roman" panose="02020603050405020304" pitchFamily="18" charset="0"/>
+                <a:cs typeface="Times New Roman" panose="02020603050405020304" pitchFamily="18" charset="0"/>
+              </a:rPr>
+              <a:t>bert_extractive_summarizer</a:t>
+            </a:r>
+            <a:r>
               <a:rPr lang="en-US" sz="1400" b="0" dirty="0">
                 <a:effectLst/>
                 <a:latin typeface="Times New Roman" panose="02020603050405020304" pitchFamily="18" charset="0"/>
                 <a:cs typeface="Times New Roman" panose="02020603050405020304" pitchFamily="18" charset="0"/>
               </a:rPr>
-              <a:t>bert_extractive_summarizer()</a:t>
-            </a:r>
-          </a:p>
-          <a:p>
-            <a:pPr algn="l" rtl="0"/>
-            <a:endParaRPr lang="en-US" sz="1400" b="0" dirty="0">
-              <a:effectLst/>
-              <a:latin typeface="Times New Roman" panose="02020603050405020304" pitchFamily="18" charset="0"/>
-              <a:cs typeface="Times New Roman" panose="02020603050405020304" pitchFamily="18" charset="0"/>
-            </a:endParaRPr>
-          </a:p>
-          <a:p>
-            <a:pPr algn="l" rtl="0"/>
-            <a:r>
-              <a:rPr lang="en-US" sz="1400" dirty="0">
-                <a:latin typeface="Times New Roman" panose="02020603050405020304" pitchFamily="18" charset="0"/>
-                <a:cs typeface="Times New Roman" panose="02020603050405020304" pitchFamily="18" charset="0"/>
-              </a:rPr>
-              <a:t>GPT2()</a:t>
+              <a:t>()</a:t>
             </a:r>
           </a:p>
         </p:txBody>
@@ -9984,7 +9969,7 @@
         <p:spPr>
           <a:xfrm>
             <a:off x="1863049" y="3372851"/>
-            <a:ext cx="8249292" cy="2246769"/>
+            <a:ext cx="8249292" cy="2677656"/>
           </a:xfrm>
           <a:prstGeom prst="rect">
             <a:avLst/>
@@ -10017,7 +10002,7 @@
                 <a:hlinkClick r:id="rId2">
                   <a:extLst>
                     <a:ext uri="{A12FA001-AC4F-418D-AE19-62706E023703}">
-                      <ahyp:hlinkClr xmlns="" xmlns:ahyp="http://schemas.microsoft.com/office/drawing/2018/hyperlinkcolor" val="tx"/>
+                      <ahyp:hlinkClr xmlns:ahyp="http://schemas.microsoft.com/office/drawing/2018/hyperlinkcolor" val="tx"/>
                     </a:ext>
                   </a:extLst>
                 </a:hlinkClick>
@@ -10058,38 +10043,129 @@
             </a:endParaRPr>
           </a:p>
           <a:p>
-            <a:pPr marL="285750" indent="-285750" algn="just" rtl="0">
-              <a:buFont typeface="Arial" panose="020B0604020202020204" pitchFamily="34" charset="0"/>
-              <a:buChar char="•"/>
-            </a:pPr>
+            <a:pPr indent="228600" algn="just" rtl="0"/>
             <a:r>
-              <a:rPr lang="en-US" sz="1400" b="0" i="0" dirty="0">
-                <a:effectLst/>
+              <a:rPr lang="en-US" sz="1400" dirty="0">
                 <a:latin typeface="Times New Roman" panose="02020603050405020304" pitchFamily="18" charset="0"/>
                 <a:cs typeface="Times New Roman" panose="02020603050405020304" pitchFamily="18" charset="0"/>
               </a:rPr>
-              <a:t>The GPT language model was initially introduced in 2018 in the paper “Language Models are Unsupervised Multitask Learners” by Alec Radford, Jeffrey Wu, Rewon Child, David Luan</a:t>
+              <a:t>This tool utilizes the </a:t>
             </a:r>
             <a:r>
-              <a:rPr lang="ru-RU" sz="1400" b="0" i="0" dirty="0">
-                <a:effectLst/>
+              <a:rPr lang="en-US" sz="1400" dirty="0" err="1">
+                <a:latin typeface="Times New Roman" panose="02020603050405020304" pitchFamily="18" charset="0"/>
+                <a:cs typeface="Times New Roman" panose="02020603050405020304" pitchFamily="18" charset="0"/>
+              </a:rPr>
+              <a:t>HuggingFace</a:t>
+            </a:r>
+            <a:r>
+              <a:rPr lang="en-US" sz="1400" dirty="0">
                 <a:latin typeface="Times New Roman" panose="02020603050405020304" pitchFamily="18" charset="0"/>
                 <a:cs typeface="Times New Roman" panose="02020603050405020304" pitchFamily="18" charset="0"/>
               </a:rPr>
               <a:t> </a:t>
             </a:r>
             <a:r>
-              <a:rPr lang="en-US" sz="1400" b="0" i="0" dirty="0">
-                <a:effectLst/>
+              <a:rPr lang="en-US" sz="1400" dirty="0" err="1">
                 <a:latin typeface="Times New Roman" panose="02020603050405020304" pitchFamily="18" charset="0"/>
                 <a:cs typeface="Times New Roman" panose="02020603050405020304" pitchFamily="18" charset="0"/>
               </a:rPr>
-              <a:t>[13], with the goal of developing a system that could learn from previously produced text. It would be able to present multiple options for completing a phrase in this way, saving time and adding diversity and linguistic depth to the text. And it was all done without any grammatical faults.</a:t>
+              <a:t>Pytorch</a:t>
             </a:r>
+            <a:r>
+              <a:rPr lang="en-US" sz="1400" dirty="0">
+                <a:latin typeface="Times New Roman" panose="02020603050405020304" pitchFamily="18" charset="0"/>
+                <a:cs typeface="Times New Roman" panose="02020603050405020304" pitchFamily="18" charset="0"/>
+              </a:rPr>
+              <a:t> transformers library to run extractive summarizations. This works by first embedding the sentences, then running a clustering algorithm, finding the sentences that are closest to the cluster's centroids. This library also uses coreference techniques, utilizing the https://github.com/huggingface/neuralcoref library to resolve words in summaries that need more context. The </a:t>
+            </a:r>
+            <a:r>
+              <a:rPr lang="en-US" sz="1400" dirty="0" err="1">
+                <a:latin typeface="Times New Roman" panose="02020603050405020304" pitchFamily="18" charset="0"/>
+                <a:cs typeface="Times New Roman" panose="02020603050405020304" pitchFamily="18" charset="0"/>
+              </a:rPr>
+              <a:t>greedyness</a:t>
+            </a:r>
+            <a:r>
+              <a:rPr lang="en-US" sz="1400" dirty="0">
+                <a:latin typeface="Times New Roman" panose="02020603050405020304" pitchFamily="18" charset="0"/>
+                <a:cs typeface="Times New Roman" panose="02020603050405020304" pitchFamily="18" charset="0"/>
+              </a:rPr>
+              <a:t> of the </a:t>
+            </a:r>
+            <a:r>
+              <a:rPr lang="en-US" sz="1400" dirty="0" err="1">
+                <a:latin typeface="Times New Roman" panose="02020603050405020304" pitchFamily="18" charset="0"/>
+                <a:cs typeface="Times New Roman" panose="02020603050405020304" pitchFamily="18" charset="0"/>
+              </a:rPr>
+              <a:t>neuralcoref</a:t>
+            </a:r>
+            <a:r>
+              <a:rPr lang="en-US" sz="1400" dirty="0">
+                <a:latin typeface="Times New Roman" panose="02020603050405020304" pitchFamily="18" charset="0"/>
+                <a:cs typeface="Times New Roman" panose="02020603050405020304" pitchFamily="18" charset="0"/>
+              </a:rPr>
+              <a:t> library can be tweaked in the </a:t>
+            </a:r>
+            <a:r>
+              <a:rPr lang="en-US" sz="1400" dirty="0" err="1">
+                <a:latin typeface="Times New Roman" panose="02020603050405020304" pitchFamily="18" charset="0"/>
+                <a:cs typeface="Times New Roman" panose="02020603050405020304" pitchFamily="18" charset="0"/>
+              </a:rPr>
+              <a:t>CoreferenceHandler</a:t>
+            </a:r>
+            <a:r>
+              <a:rPr lang="en-US" sz="1400" dirty="0">
+                <a:latin typeface="Times New Roman" panose="02020603050405020304" pitchFamily="18" charset="0"/>
+                <a:cs typeface="Times New Roman" panose="02020603050405020304" pitchFamily="18" charset="0"/>
+              </a:rPr>
+              <a:t> class.</a:t>
+            </a:r>
+          </a:p>
+          <a:p>
+            <a:pPr indent="228600" algn="just" rtl="0"/>
             <a:endParaRPr lang="en-US" sz="1400" dirty="0">
               <a:latin typeface="Times New Roman" panose="02020603050405020304" pitchFamily="18" charset="0"/>
               <a:cs typeface="Times New Roman" panose="02020603050405020304" pitchFamily="18" charset="0"/>
             </a:endParaRPr>
+          </a:p>
+          <a:p>
+            <a:pPr indent="228600" algn="just" rtl="0"/>
+            <a:r>
+              <a:rPr lang="en-US" sz="1400" dirty="0">
+                <a:latin typeface="Times New Roman" panose="02020603050405020304" pitchFamily="18" charset="0"/>
+                <a:cs typeface="Times New Roman" panose="02020603050405020304" pitchFamily="18" charset="0"/>
+              </a:rPr>
+              <a:t>As of the most recent version of </a:t>
+            </a:r>
+            <a:r>
+              <a:rPr lang="en-US" sz="1400" dirty="0" err="1">
+                <a:latin typeface="Times New Roman" panose="02020603050405020304" pitchFamily="18" charset="0"/>
+                <a:cs typeface="Times New Roman" panose="02020603050405020304" pitchFamily="18" charset="0"/>
+              </a:rPr>
+              <a:t>bert</a:t>
+            </a:r>
+            <a:r>
+              <a:rPr lang="en-US" sz="1400" dirty="0">
+                <a:latin typeface="Times New Roman" panose="02020603050405020304" pitchFamily="18" charset="0"/>
+                <a:cs typeface="Times New Roman" panose="02020603050405020304" pitchFamily="18" charset="0"/>
+              </a:rPr>
+              <a:t>-extractive-summarizer, by default, CUDA is used if a </a:t>
+            </a:r>
+            <a:r>
+              <a:rPr lang="en-US" sz="1400" dirty="0" err="1">
+                <a:latin typeface="Times New Roman" panose="02020603050405020304" pitchFamily="18" charset="0"/>
+                <a:cs typeface="Times New Roman" panose="02020603050405020304" pitchFamily="18" charset="0"/>
+              </a:rPr>
+              <a:t>gpu</a:t>
+            </a:r>
+            <a:r>
+              <a:rPr lang="en-US" sz="1400" dirty="0">
+                <a:latin typeface="Times New Roman" panose="02020603050405020304" pitchFamily="18" charset="0"/>
+                <a:cs typeface="Times New Roman" panose="02020603050405020304" pitchFamily="18" charset="0"/>
+              </a:rPr>
+              <a:t> is available.</a:t>
+            </a:r>
           </a:p>
         </p:txBody>
       </p:sp>
@@ -10281,25 +10357,306 @@
   <p:clrMapOvr>
     <a:masterClrMapping/>
   </p:clrMapOvr>
-  <mc:AlternateContent xmlns:mc="http://schemas.openxmlformats.org/markup-compatibility/2006" xmlns:p14="http://schemas.microsoft.com/office/powerpoint/2010/main">
-    <mc:Choice Requires="p14">
-      <p:transition p14:dur="0"/>
-    </mc:Choice>
-    <mc:Fallback xmlns="">
-      <p:transition/>
-    </mc:Fallback>
-  </mc:AlternateContent>
-  <p:timing>
-    <p:tnLst>
-      <p:par>
-        <p:cTn id="1" dur="indefinite" restart="never" nodeType="tmRoot"/>
-      </p:par>
-    </p:tnLst>
-  </p:timing>
 </p:sld>
 </file>
 
 <file path=ppt/slides/slide11.xml><?xml version="1.0" encoding="utf-8"?>
+<p:sld xmlns:a="http://schemas.openxmlformats.org/drawingml/2006/main" xmlns:r="http://schemas.openxmlformats.org/officeDocument/2006/relationships" xmlns:p="http://schemas.openxmlformats.org/presentationml/2006/main">
+  <p:cSld>
+    <p:spTree>
+      <p:nvGrpSpPr>
+        <p:cNvPr id="1" name=""/>
+        <p:cNvGrpSpPr/>
+        <p:nvPr/>
+      </p:nvGrpSpPr>
+      <p:grpSpPr>
+        <a:xfrm>
+          <a:off x="0" y="0"/>
+          <a:ext cx="0" cy="0"/>
+          <a:chOff x="0" y="0"/>
+          <a:chExt cx="0" cy="0"/>
+        </a:xfrm>
+      </p:grpSpPr>
+      <p:sp>
+        <p:nvSpPr>
+          <p:cNvPr id="2" name="Rectangle 1">
+            <a:extLst>
+              <a:ext uri="{FF2B5EF4-FFF2-40B4-BE49-F238E27FC236}">
+                <a16:creationId xmlns:a16="http://schemas.microsoft.com/office/drawing/2014/main" id="{AA2A9A76-14A4-02F4-FF2C-84D7D20F1382}"/>
+              </a:ext>
+            </a:extLst>
+          </p:cNvPr>
+          <p:cNvSpPr/>
+          <p:nvPr/>
+        </p:nvSpPr>
+        <p:spPr>
+          <a:xfrm>
+            <a:off x="3048000" y="226371"/>
+            <a:ext cx="6096000" cy="1261884"/>
+          </a:xfrm>
+          <a:prstGeom prst="rect">
+            <a:avLst/>
+          </a:prstGeom>
+        </p:spPr>
+        <p:txBody>
+          <a:bodyPr>
+            <a:spAutoFit/>
+          </a:bodyPr>
+          <a:lstStyle/>
+          <a:p>
+            <a:pPr algn="ctr"/>
+            <a:r>
+              <a:rPr lang="en-US" sz="4400" b="1" dirty="0">
+                <a:solidFill>
+                  <a:schemeClr val="accent6"/>
+                </a:solidFill>
+              </a:rPr>
+              <a:t>Project implementation</a:t>
+            </a:r>
+          </a:p>
+          <a:p>
+            <a:pPr algn="ctr" rtl="0"/>
+            <a:r>
+              <a:rPr lang="en-US" sz="3200" b="1" dirty="0">
+                <a:solidFill>
+                  <a:schemeClr val="accent6"/>
+                </a:solidFill>
+              </a:rPr>
+              <a:t>Details of the steps, part 2.2</a:t>
+            </a:r>
+          </a:p>
+        </p:txBody>
+      </p:sp>
+      <p:sp>
+        <p:nvSpPr>
+          <p:cNvPr id="3" name="Oval 2">
+            <a:extLst>
+              <a:ext uri="{FF2B5EF4-FFF2-40B4-BE49-F238E27FC236}">
+                <a16:creationId xmlns:a16="http://schemas.microsoft.com/office/drawing/2014/main" id="{45245AE2-10D5-8602-E726-BA29C64B3E73}"/>
+              </a:ext>
+            </a:extLst>
+          </p:cNvPr>
+          <p:cNvSpPr/>
+          <p:nvPr/>
+        </p:nvSpPr>
+        <p:spPr>
+          <a:xfrm>
+            <a:off x="3897853" y="1714161"/>
+            <a:ext cx="2065105" cy="854468"/>
+          </a:xfrm>
+          <a:prstGeom prst="ellipse">
+            <a:avLst/>
+          </a:prstGeom>
+          <a:solidFill>
+            <a:schemeClr val="accent3">
+              <a:lumMod val="75000"/>
+            </a:schemeClr>
+          </a:solidFill>
+          <a:ln>
+            <a:solidFill>
+              <a:schemeClr val="accent3">
+                <a:lumMod val="75000"/>
+              </a:schemeClr>
+            </a:solidFill>
+          </a:ln>
+        </p:spPr>
+        <p:style>
+          <a:lnRef idx="2">
+            <a:schemeClr val="accent1">
+              <a:shade val="50000"/>
+            </a:schemeClr>
+          </a:lnRef>
+          <a:fillRef idx="1">
+            <a:schemeClr val="accent1"/>
+          </a:fillRef>
+          <a:effectRef idx="0">
+            <a:schemeClr val="accent1"/>
+          </a:effectRef>
+          <a:fontRef idx="minor">
+            <a:schemeClr val="lt1"/>
+          </a:fontRef>
+        </p:style>
+        <p:txBody>
+          <a:bodyPr rtlCol="0" anchor="ctr"/>
+          <a:lstStyle/>
+          <a:p>
+            <a:pPr algn="ctr"/>
+            <a:r>
+              <a:rPr lang="en-US" dirty="0"/>
+              <a:t>3. Summary</a:t>
+            </a:r>
+          </a:p>
+        </p:txBody>
+      </p:sp>
+      <p:sp>
+        <p:nvSpPr>
+          <p:cNvPr id="4" name="Rectangle 3">
+            <a:extLst>
+              <a:ext uri="{FF2B5EF4-FFF2-40B4-BE49-F238E27FC236}">
+                <a16:creationId xmlns:a16="http://schemas.microsoft.com/office/drawing/2014/main" id="{F5D4DE2A-4A50-E89C-F7F6-A01E2AFCDAC6}"/>
+              </a:ext>
+            </a:extLst>
+          </p:cNvPr>
+          <p:cNvSpPr/>
+          <p:nvPr/>
+        </p:nvSpPr>
+        <p:spPr>
+          <a:xfrm>
+            <a:off x="6858001" y="2003387"/>
+            <a:ext cx="833284" cy="369332"/>
+          </a:xfrm>
+          <a:prstGeom prst="rect">
+            <a:avLst/>
+          </a:prstGeom>
+        </p:spPr>
+        <p:txBody>
+          <a:bodyPr wrap="square">
+            <a:spAutoFit/>
+          </a:bodyPr>
+          <a:lstStyle/>
+          <a:p>
+            <a:pPr algn="l" rtl="0"/>
+            <a:r>
+              <a:rPr lang="en-US" dirty="0">
+                <a:latin typeface="Times New Roman" panose="02020603050405020304" pitchFamily="18" charset="0"/>
+                <a:cs typeface="Times New Roman" panose="02020603050405020304" pitchFamily="18" charset="0"/>
+              </a:rPr>
+              <a:t>GPT2</a:t>
+            </a:r>
+            <a:endParaRPr lang="en-US" sz="1400" dirty="0">
+              <a:latin typeface="Times New Roman" panose="02020603050405020304" pitchFamily="18" charset="0"/>
+              <a:cs typeface="Times New Roman" panose="02020603050405020304" pitchFamily="18" charset="0"/>
+            </a:endParaRPr>
+          </a:p>
+        </p:txBody>
+      </p:sp>
+      <p:sp>
+        <p:nvSpPr>
+          <p:cNvPr id="7" name="TextBox 6">
+            <a:extLst>
+              <a:ext uri="{FF2B5EF4-FFF2-40B4-BE49-F238E27FC236}">
+                <a16:creationId xmlns:a16="http://schemas.microsoft.com/office/drawing/2014/main" id="{D6527E8C-8B6C-6314-5B8C-E9D45F3F67E9}"/>
+              </a:ext>
+            </a:extLst>
+          </p:cNvPr>
+          <p:cNvSpPr txBox="1"/>
+          <p:nvPr/>
+        </p:nvSpPr>
+        <p:spPr>
+          <a:xfrm>
+            <a:off x="1270206" y="2964304"/>
+            <a:ext cx="9385504" cy="2893100"/>
+          </a:xfrm>
+          <a:prstGeom prst="rect">
+            <a:avLst/>
+          </a:prstGeom>
+          <a:noFill/>
+        </p:spPr>
+        <p:txBody>
+          <a:bodyPr wrap="square">
+            <a:spAutoFit/>
+          </a:bodyPr>
+          <a:lstStyle/>
+          <a:p>
+            <a:pPr indent="228600" algn="just" rtl="0"/>
+            <a:r>
+              <a:rPr lang="en-US" sz="1400" dirty="0">
+                <a:latin typeface="Times New Roman" panose="02020603050405020304" pitchFamily="18" charset="0"/>
+                <a:cs typeface="Times New Roman" panose="02020603050405020304" pitchFamily="18" charset="0"/>
+              </a:rPr>
+              <a:t>GPT-2 is a large transformer-based language model with 1.5 billion parameters, trained on a dataset of 8 million web pages. GPT-2 is trained with a simple objective: predict the next word, given all of the previous words within some text. The diversity of the dataset causes this simple goal to contain naturally occurring demonstrations of many tasks across diverse domains. GPT-2 is a direct scale-up of GPT, with more than 10X the parameters and trained on more than 10X the amount of data. </a:t>
+            </a:r>
+          </a:p>
+          <a:p>
+            <a:pPr indent="228600" algn="just" rtl="0"/>
+            <a:endParaRPr lang="en-US" sz="1400" dirty="0">
+              <a:latin typeface="Times New Roman" panose="02020603050405020304" pitchFamily="18" charset="0"/>
+              <a:cs typeface="Times New Roman" panose="02020603050405020304" pitchFamily="18" charset="0"/>
+            </a:endParaRPr>
+          </a:p>
+          <a:p>
+            <a:pPr marL="285750" indent="-285750" algn="just" rtl="0">
+              <a:buFont typeface="Arial" panose="020B0604020202020204" pitchFamily="34" charset="0"/>
+              <a:buChar char="•"/>
+            </a:pPr>
+            <a:r>
+              <a:rPr lang="en-US" sz="1400" dirty="0">
+                <a:latin typeface="Times New Roman" panose="02020603050405020304" pitchFamily="18" charset="0"/>
+                <a:cs typeface="Times New Roman" panose="02020603050405020304" pitchFamily="18" charset="0"/>
+              </a:rPr>
+              <a:t>GPT-2 is a model with absolute position embeddings so it’s usually advised to pad the inputs on the right rather than the left.</a:t>
+            </a:r>
+          </a:p>
+          <a:p>
+            <a:pPr marL="285750" indent="-285750" algn="just" rtl="0">
+              <a:buFont typeface="Arial" panose="020B0604020202020204" pitchFamily="34" charset="0"/>
+              <a:buChar char="•"/>
+            </a:pPr>
+            <a:r>
+              <a:rPr lang="en-US" sz="1400" dirty="0">
+                <a:latin typeface="Times New Roman" panose="02020603050405020304" pitchFamily="18" charset="0"/>
+                <a:cs typeface="Times New Roman" panose="02020603050405020304" pitchFamily="18" charset="0"/>
+              </a:rPr>
+              <a:t>GPT-2 was trained with a causal language modeling (CLM) objective and is therefore powerful at predicting the next token in a sequence. Leveraging this feature allows GPT-2 to generate syntactically coherent text as it can be observed in the run_generation.py example script.</a:t>
+            </a:r>
+          </a:p>
+          <a:p>
+            <a:pPr marL="285750" indent="-285750" algn="just" rtl="0">
+              <a:buFont typeface="Arial" panose="020B0604020202020204" pitchFamily="34" charset="0"/>
+              <a:buChar char="•"/>
+            </a:pPr>
+            <a:r>
+              <a:rPr lang="en-US" sz="1400" dirty="0">
+                <a:latin typeface="Times New Roman" panose="02020603050405020304" pitchFamily="18" charset="0"/>
+                <a:cs typeface="Times New Roman" panose="02020603050405020304" pitchFamily="18" charset="0"/>
+              </a:rPr>
+              <a:t>The </a:t>
+            </a:r>
+            <a:r>
+              <a:rPr lang="en-US" sz="1400" dirty="0" err="1">
+                <a:latin typeface="Times New Roman" panose="02020603050405020304" pitchFamily="18" charset="0"/>
+                <a:cs typeface="Times New Roman" panose="02020603050405020304" pitchFamily="18" charset="0"/>
+              </a:rPr>
+              <a:t>PyTorch</a:t>
+            </a:r>
+            <a:r>
+              <a:rPr lang="en-US" sz="1400" dirty="0">
+                <a:latin typeface="Times New Roman" panose="02020603050405020304" pitchFamily="18" charset="0"/>
+                <a:cs typeface="Times New Roman" panose="02020603050405020304" pitchFamily="18" charset="0"/>
+              </a:rPr>
+              <a:t> models can take the past as input, which is the previously computed key/value attention pairs. Using this past value prevents the model from re-computing pre-computed values in the context of text generation. </a:t>
+            </a:r>
+          </a:p>
+          <a:p>
+            <a:pPr indent="228600" algn="just" rtl="0"/>
+            <a:endParaRPr lang="en-US" sz="1400" dirty="0">
+              <a:latin typeface="Times New Roman" panose="02020603050405020304" pitchFamily="18" charset="0"/>
+              <a:cs typeface="Times New Roman" panose="02020603050405020304" pitchFamily="18" charset="0"/>
+            </a:endParaRPr>
+          </a:p>
+          <a:p>
+            <a:pPr indent="228600" algn="just" rtl="0"/>
+            <a:endParaRPr lang="en-US" sz="1400" dirty="0">
+              <a:latin typeface="Times New Roman" panose="02020603050405020304" pitchFamily="18" charset="0"/>
+              <a:cs typeface="Times New Roman" panose="02020603050405020304" pitchFamily="18" charset="0"/>
+            </a:endParaRPr>
+          </a:p>
+        </p:txBody>
+      </p:sp>
+    </p:spTree>
+    <p:extLst>
+      <p:ext uri="{BB962C8B-B14F-4D97-AF65-F5344CB8AC3E}">
+        <p14:creationId xmlns:p14="http://schemas.microsoft.com/office/powerpoint/2010/main" val="2431660918"/>
+      </p:ext>
+    </p:extLst>
+  </p:cSld>
+  <p:clrMapOvr>
+    <a:masterClrMapping/>
+  </p:clrMapOvr>
+</p:sld>
+</file>
+
+<file path=ppt/slides/slide12.xml><?xml version="1.0" encoding="utf-8"?>
 <p:sld xmlns:a="http://schemas.openxmlformats.org/drawingml/2006/main" xmlns:r="http://schemas.openxmlformats.org/officeDocument/2006/relationships" xmlns:p="http://schemas.openxmlformats.org/presentationml/2006/main">
   <p:cSld>
     <p:spTree>
@@ -10330,7 +10687,7 @@
         </p:nvSpPr>
         <p:spPr>
           <a:xfrm>
-            <a:off x="3305510" y="2047912"/>
+            <a:off x="1445888" y="2106986"/>
             <a:ext cx="2065105" cy="854468"/>
           </a:xfrm>
           <a:prstGeom prst="ellipse">
@@ -10391,7 +10748,7 @@
         </p:nvSpPr>
         <p:spPr>
           <a:xfrm>
-            <a:off x="6477463" y="1949445"/>
+            <a:off x="3919198" y="1949444"/>
             <a:ext cx="2290066" cy="1169551"/>
           </a:xfrm>
           <a:prstGeom prst="rect">
@@ -10551,7 +10908,7 @@
         <p:spPr>
           <a:xfrm>
             <a:off x="1236078" y="3360129"/>
-            <a:ext cx="9438338" cy="2314544"/>
+            <a:ext cx="9438338" cy="2354491"/>
           </a:xfrm>
           <a:prstGeom prst="rect">
             <a:avLst/>
@@ -10717,7 +11074,7 @@
                 <a:hlinkClick r:id="rId2" tooltip="Longest common subsequence problem">
                   <a:extLst>
                     <a:ext uri="{A12FA001-AC4F-418D-AE19-62706E023703}">
-                      <ahyp:hlinkClr xmlns="" xmlns:ahyp="http://schemas.microsoft.com/office/drawing/2018/hyperlinkcolor" val="tx"/>
+                      <ahyp:hlinkClr xmlns:ahyp="http://schemas.microsoft.com/office/drawing/2018/hyperlinkcolor" val="tx"/>
                     </a:ext>
                   </a:extLst>
                 </a:hlinkClick>
@@ -10729,8 +11086,19 @@
                 <a:effectLst/>
                 <a:latin typeface="Arial" panose="020B0604020202020204" pitchFamily="34" charset="0"/>
               </a:rPr>
-              <a:t> takes into account sentence level structure similarity naturally and identifies longest co-occurring in sequence n-grams automatically.</a:t>
+              <a:t> takes into account sentence level structure similarity naturally and identifies longest co-occurring in sequence </a:t>
             </a:r>
+            <a:r>
+              <a:rPr lang="en-US" sz="1400" b="0" i="0">
+                <a:effectLst/>
+                <a:latin typeface="Arial" panose="020B0604020202020204" pitchFamily="34" charset="0"/>
+              </a:rPr>
+              <a:t>n-grams automatically [15].</a:t>
+            </a:r>
+            <a:endParaRPr lang="en-US" sz="1400" b="0" i="0" dirty="0">
+              <a:effectLst/>
+              <a:latin typeface="Arial" panose="020B0604020202020204" pitchFamily="34" charset="0"/>
+            </a:endParaRPr>
           </a:p>
         </p:txBody>
       </p:sp>
@@ -10835,6 +11203,154 @@
           </a:p>
         </p:txBody>
       </p:sp>
+      <p:sp>
+        <p:nvSpPr>
+          <p:cNvPr id="8" name="Rectangle 7"/>
+          <p:cNvSpPr/>
+          <p:nvPr/>
+        </p:nvSpPr>
+        <p:spPr>
+          <a:xfrm>
+            <a:off x="6931631" y="2106986"/>
+            <a:ext cx="4443842" cy="1154162"/>
+          </a:xfrm>
+          <a:prstGeom prst="rect">
+            <a:avLst/>
+          </a:prstGeom>
+        </p:spPr>
+        <p:txBody>
+          <a:bodyPr wrap="square">
+            <a:spAutoFit/>
+          </a:bodyPr>
+          <a:lstStyle/>
+          <a:p>
+            <a:pPr algn="l" rtl="0"/>
+            <a:r>
+              <a:rPr lang="en-US" sz="1400" dirty="0">
+                <a:solidFill>
+                  <a:schemeClr val="accent6"/>
+                </a:solidFill>
+              </a:rPr>
+              <a:t>Example ROUGE1: </a:t>
+            </a:r>
+          </a:p>
+          <a:p>
+            <a:pPr lvl="1" algn="l" rtl="0"/>
+            <a:r>
+              <a:rPr lang="en-US" sz="1100" dirty="0"/>
+              <a:t>Reference Tokens: ['</a:t>
+            </a:r>
+            <a:r>
+              <a:rPr lang="en-US" sz="1100" dirty="0" err="1"/>
+              <a:t>John','really','loves','data','science</a:t>
+            </a:r>
+            <a:r>
+              <a:rPr lang="en-US" sz="1100" dirty="0"/>
+              <a:t>'](</a:t>
+            </a:r>
+            <a:r>
+              <a:rPr lang="en-US" sz="1100" dirty="0" err="1"/>
+              <a:t>n_r</a:t>
+            </a:r>
+            <a:r>
+              <a:rPr lang="en-US" sz="1100" dirty="0"/>
+              <a:t>=5)</a:t>
+            </a:r>
+          </a:p>
+          <a:p>
+            <a:pPr lvl="1" algn="l" rtl="0"/>
+            <a:r>
+              <a:rPr lang="en-US" sz="1100" dirty="0"/>
+              <a:t>Candidate Tokens: ['</a:t>
+            </a:r>
+            <a:r>
+              <a:rPr lang="en-US" sz="1100" dirty="0" err="1"/>
+              <a:t>John','loves','data','science</a:t>
+            </a:r>
+            <a:r>
+              <a:rPr lang="en-US" sz="1100" dirty="0"/>
+              <a:t>'] (</a:t>
+            </a:r>
+            <a:r>
+              <a:rPr lang="en-US" sz="1100" dirty="0" err="1"/>
+              <a:t>n_can</a:t>
+            </a:r>
+            <a:r>
+              <a:rPr lang="en-US" sz="1100" dirty="0"/>
+              <a:t>=4)</a:t>
+            </a:r>
+          </a:p>
+          <a:p>
+            <a:pPr lvl="1" algn="l" rtl="0"/>
+            <a:r>
+              <a:rPr lang="en-US" sz="1100" dirty="0"/>
+              <a:t>Captured Tokens: ['</a:t>
+            </a:r>
+            <a:r>
+              <a:rPr lang="en-US" sz="1100" dirty="0" err="1"/>
+              <a:t>John','loves','data','science</a:t>
+            </a:r>
+            <a:r>
+              <a:rPr lang="en-US" sz="1100" dirty="0"/>
+              <a:t>'] (</a:t>
+            </a:r>
+            <a:r>
+              <a:rPr lang="en-US" sz="1100" dirty="0" err="1"/>
+              <a:t>n_cap</a:t>
+            </a:r>
+            <a:r>
+              <a:rPr lang="en-US" sz="1100" dirty="0"/>
+              <a:t>=4)</a:t>
+            </a:r>
+          </a:p>
+          <a:p>
+            <a:pPr lvl="1" algn="l" rtl="0"/>
+            <a:r>
+              <a:rPr lang="en-US" sz="1100" dirty="0"/>
+              <a:t>Rouge-1 Recall = </a:t>
+            </a:r>
+            <a:r>
+              <a:rPr lang="en-US" sz="1100" dirty="0" err="1"/>
+              <a:t>n_cap</a:t>
+            </a:r>
+            <a:r>
+              <a:rPr lang="en-US" sz="1100" dirty="0"/>
+              <a:t>/</a:t>
+            </a:r>
+            <a:r>
+              <a:rPr lang="en-US" sz="1100" dirty="0" err="1"/>
+              <a:t>n_r</a:t>
+            </a:r>
+            <a:r>
+              <a:rPr lang="en-US" sz="1100" dirty="0"/>
+              <a:t> = 4/5 </a:t>
+            </a:r>
+          </a:p>
+          <a:p>
+            <a:pPr lvl="1" algn="l" rtl="0"/>
+            <a:r>
+              <a:rPr lang="en-US" sz="1100" dirty="0"/>
+              <a:t>Rouge-1 Precision = </a:t>
+            </a:r>
+            <a:r>
+              <a:rPr lang="en-US" sz="1100" dirty="0" err="1"/>
+              <a:t>n_cap</a:t>
+            </a:r>
+            <a:r>
+              <a:rPr lang="en-US" sz="1100" dirty="0"/>
+              <a:t>/</a:t>
+            </a:r>
+            <a:r>
+              <a:rPr lang="en-US" sz="1100" dirty="0" err="1"/>
+              <a:t>n_can</a:t>
+            </a:r>
+            <a:r>
+              <a:rPr lang="en-US" sz="1100" dirty="0"/>
+              <a:t> = 4/4</a:t>
+            </a:r>
+          </a:p>
+        </p:txBody>
+      </p:sp>
     </p:spTree>
     <p:extLst>
       <p:ext uri="{BB962C8B-B14F-4D97-AF65-F5344CB8AC3E}">
@@ -10845,25 +11361,10 @@
   <p:clrMapOvr>
     <a:masterClrMapping/>
   </p:clrMapOvr>
-  <mc:AlternateContent xmlns:mc="http://schemas.openxmlformats.org/markup-compatibility/2006" xmlns:p14="http://schemas.microsoft.com/office/powerpoint/2010/main">
-    <mc:Choice Requires="p14">
-      <p:transition p14:dur="0"/>
-    </mc:Choice>
-    <mc:Fallback xmlns="">
-      <p:transition/>
-    </mc:Fallback>
-  </mc:AlternateContent>
-  <p:timing>
-    <p:tnLst>
-      <p:par>
-        <p:cTn id="1" dur="indefinite" restart="never" nodeType="tmRoot"/>
-      </p:par>
-    </p:tnLst>
-  </p:timing>
 </p:sld>
 </file>
 
-<file path=ppt/slides/slide12.xml><?xml version="1.0" encoding="utf-8"?>
+<file path=ppt/slides/slide13.xml><?xml version="1.0" encoding="utf-8"?>
 <p:sld xmlns:a="http://schemas.openxmlformats.org/drawingml/2006/main" xmlns:r="http://schemas.openxmlformats.org/officeDocument/2006/relationships" xmlns:p="http://schemas.openxmlformats.org/presentationml/2006/main">
   <p:cSld>
     <p:spTree>
@@ -10925,7 +11426,7 @@
                   <a:schemeClr val="accent6"/>
                 </a:solidFill>
               </a:rPr>
-              <a:t>Details of the steps, part 4</a:t>
+              <a:t>Details of the steps, part 4.1</a:t>
             </a:r>
           </a:p>
         </p:txBody>
@@ -10944,7 +11445,7 @@
         </p:nvSpPr>
         <p:spPr>
           <a:xfrm>
-            <a:off x="631433" y="2474633"/>
+            <a:off x="771542" y="3156039"/>
             <a:ext cx="2065105" cy="854468"/>
           </a:xfrm>
           <a:prstGeom prst="ellipse">
@@ -11000,14 +11501,14 @@
           <p:nvPr>
             <p:extLst>
               <p:ext uri="{D42A27DB-BD31-4B8C-83A1-F6EECF244321}">
-                <p14:modId xmlns:p14="http://schemas.microsoft.com/office/powerpoint/2010/main" val="3490482110"/>
+                <p14:modId xmlns:p14="http://schemas.microsoft.com/office/powerpoint/2010/main" val="3460341727"/>
               </p:ext>
             </p:extLst>
           </p:nvPr>
         </p:nvGraphicFramePr>
         <p:xfrm>
-          <a:off x="3208677" y="1596942"/>
-          <a:ext cx="8178801" cy="2609850"/>
+          <a:off x="3120188" y="2385981"/>
+          <a:ext cx="7712505" cy="2394585"/>
         </p:xfrm>
         <a:graphic>
           <a:graphicData uri="http://schemas.openxmlformats.org/drawingml/2006/table">
@@ -11016,49 +11517,49 @@
                 <a:tableStyleId>{5C22544A-7EE6-4342-B048-85BDC9FD1C3A}</a:tableStyleId>
               </a:tblPr>
               <a:tblGrid>
-                <a:gridCol w="1251662">
+                <a:gridCol w="1180301">
                   <a:extLst>
                     <a:ext uri="{9D8B030D-6E8A-4147-A177-3AD203B41FA5}">
                       <a16:colId xmlns:a16="http://schemas.microsoft.com/office/drawing/2014/main" val="1411005097"/>
                     </a:ext>
                   </a:extLst>
                 </a:gridCol>
-                <a:gridCol w="1442756">
+                <a:gridCol w="1360500">
                   <a:extLst>
                     <a:ext uri="{9D8B030D-6E8A-4147-A177-3AD203B41FA5}">
                       <a16:colId xmlns:a16="http://schemas.microsoft.com/office/drawing/2014/main" val="2532729056"/>
                     </a:ext>
                   </a:extLst>
                 </a:gridCol>
-                <a:gridCol w="1089233">
+                <a:gridCol w="1027133">
                   <a:extLst>
                     <a:ext uri="{9D8B030D-6E8A-4147-A177-3AD203B41FA5}">
                       <a16:colId xmlns:a16="http://schemas.microsoft.com/office/drawing/2014/main" val="2126571955"/>
                     </a:ext>
                   </a:extLst>
                 </a:gridCol>
-                <a:gridCol w="1089233">
+                <a:gridCol w="1027133">
                   <a:extLst>
                     <a:ext uri="{9D8B030D-6E8A-4147-A177-3AD203B41FA5}">
                       <a16:colId xmlns:a16="http://schemas.microsoft.com/office/drawing/2014/main" val="3704007317"/>
                     </a:ext>
                   </a:extLst>
                 </a:gridCol>
-                <a:gridCol w="1089233">
+                <a:gridCol w="1027133">
                   <a:extLst>
                     <a:ext uri="{9D8B030D-6E8A-4147-A177-3AD203B41FA5}">
                       <a16:colId xmlns:a16="http://schemas.microsoft.com/office/drawing/2014/main" val="898690555"/>
                     </a:ext>
                   </a:extLst>
                 </a:gridCol>
-                <a:gridCol w="1089233">
+                <a:gridCol w="1027133">
                   <a:extLst>
                     <a:ext uri="{9D8B030D-6E8A-4147-A177-3AD203B41FA5}">
                       <a16:colId xmlns:a16="http://schemas.microsoft.com/office/drawing/2014/main" val="1007377935"/>
                     </a:ext>
                   </a:extLst>
                 </a:gridCol>
-                <a:gridCol w="1127451">
+                <a:gridCol w="1063172">
                   <a:extLst>
                     <a:ext uri="{9D8B030D-6E8A-4147-A177-3AD203B41FA5}">
                       <a16:colId xmlns:a16="http://schemas.microsoft.com/office/drawing/2014/main" val="2126954264"/>
@@ -11066,14 +11567,14 @@
                   </a:extLst>
                 </a:gridCol>
               </a:tblGrid>
-              <a:tr h="247650">
+              <a:tr h="204634">
                 <a:tc>
                   <a:txBody>
                     <a:bodyPr/>
                     <a:lstStyle/>
                     <a:p>
                       <a:pPr algn="l" fontAlgn="b"/>
-                      <a:endParaRPr lang="en-US" sz="1100" b="0" i="0" u="none" strike="noStrike">
+                      <a:endParaRPr lang="en-US" sz="1100" b="0" i="0" u="none" strike="noStrike" dirty="0">
                         <a:solidFill>
                           <a:srgbClr val="000000"/>
                         </a:solidFill>
@@ -11091,12 +11592,12 @@
                     <a:p>
                       <a:pPr algn="ctr" fontAlgn="ctr"/>
                       <a:r>
-                        <a:rPr lang="en-US" sz="1400" u="none" strike="noStrike">
+                        <a:rPr lang="en-US" sz="1400" u="none" strike="noStrike" dirty="0">
                           <a:effectLst/>
                         </a:rPr>
                         <a:t>rouge1</a:t>
                       </a:r>
-                      <a:endParaRPr lang="en-US" sz="1400" b="0" i="0" u="none" strike="noStrike">
+                      <a:endParaRPr lang="en-US" sz="1400" b="0" i="0" u="none" strike="noStrike" dirty="0">
                         <a:solidFill>
                           <a:srgbClr val="000000"/>
                         </a:solidFill>
@@ -11124,12 +11625,12 @@
                     <a:p>
                       <a:pPr algn="ctr" fontAlgn="ctr"/>
                       <a:r>
-                        <a:rPr lang="en-US" sz="1400" u="none" strike="noStrike">
+                        <a:rPr lang="en-US" sz="1400" u="none" strike="noStrike" dirty="0">
                           <a:effectLst/>
                         </a:rPr>
                         <a:t>rouge2</a:t>
                       </a:r>
-                      <a:endParaRPr lang="en-US" sz="1400" b="0" i="0" u="none" strike="noStrike">
+                      <a:endParaRPr lang="en-US" sz="1400" b="0" i="0" u="none" strike="noStrike" dirty="0">
                         <a:solidFill>
                           <a:srgbClr val="000000"/>
                         </a:solidFill>
@@ -11157,12 +11658,12 @@
                     <a:p>
                       <a:pPr algn="ctr" fontAlgn="ctr"/>
                       <a:r>
-                        <a:rPr lang="en-US" sz="1400" u="none" strike="noStrike">
+                        <a:rPr lang="en-US" sz="1400" u="none" strike="noStrike" dirty="0" err="1">
                           <a:effectLst/>
                         </a:rPr>
                         <a:t>rougeL</a:t>
                       </a:r>
-                      <a:endParaRPr lang="en-US" sz="1400" b="0" i="0" u="none" strike="noStrike">
+                      <a:endParaRPr lang="en-US" sz="1400" b="0" i="0" u="none" strike="noStrike" dirty="0">
                         <a:solidFill>
                           <a:srgbClr val="000000"/>
                         </a:solidFill>
@@ -11189,7 +11690,7 @@
                   </a:ext>
                 </a:extLst>
               </a:tr>
-              <a:tr h="247650">
+              <a:tr h="204634">
                 <a:tc>
                   <a:txBody>
                     <a:bodyPr/>
@@ -11237,12 +11738,12 @@
                     <a:p>
                       <a:pPr algn="ctr" fontAlgn="ctr"/>
                       <a:r>
-                        <a:rPr lang="en-US" sz="1400" u="none" strike="noStrike">
+                        <a:rPr lang="en-US" sz="1400" u="none" strike="noStrike" dirty="0">
                           <a:effectLst/>
                         </a:rPr>
                         <a:t>GPT2</a:t>
                       </a:r>
-                      <a:endParaRPr lang="en-US" sz="1400" b="0" i="0" u="none" strike="noStrike">
+                      <a:endParaRPr lang="en-US" sz="1400" b="0" i="0" u="none" strike="noStrike" dirty="0">
                         <a:solidFill>
                           <a:srgbClr val="000000"/>
                         </a:solidFill>
@@ -11260,12 +11761,12 @@
                     <a:p>
                       <a:pPr algn="ctr" fontAlgn="ctr"/>
                       <a:r>
-                        <a:rPr lang="en-US" sz="1400" u="none" strike="noStrike">
+                        <a:rPr lang="en-US" sz="1400" u="none" strike="noStrike" dirty="0">
                           <a:effectLst/>
                         </a:rPr>
                         <a:t>BERT</a:t>
                       </a:r>
-                      <a:endParaRPr lang="en-US" sz="1400" b="0" i="0" u="none" strike="noStrike">
+                      <a:endParaRPr lang="en-US" sz="1400" b="0" i="0" u="none" strike="noStrike" dirty="0">
                         <a:solidFill>
                           <a:srgbClr val="000000"/>
                         </a:solidFill>
@@ -11283,12 +11784,12 @@
                     <a:p>
                       <a:pPr algn="ctr" fontAlgn="ctr"/>
                       <a:r>
-                        <a:rPr lang="en-US" sz="1400" u="none" strike="noStrike">
+                        <a:rPr lang="en-US" sz="1400" u="none" strike="noStrike" dirty="0">
                           <a:effectLst/>
                         </a:rPr>
                         <a:t>GPT2</a:t>
                       </a:r>
-                      <a:endParaRPr lang="en-US" sz="1400" b="0" i="0" u="none" strike="noStrike">
+                      <a:endParaRPr lang="en-US" sz="1400" b="0" i="0" u="none" strike="noStrike" dirty="0">
                         <a:solidFill>
                           <a:srgbClr val="000000"/>
                         </a:solidFill>
@@ -11306,12 +11807,12 @@
                     <a:p>
                       <a:pPr algn="ctr" fontAlgn="ctr"/>
                       <a:r>
-                        <a:rPr lang="en-US" sz="1400" u="none" strike="noStrike">
+                        <a:rPr lang="en-US" sz="1400" u="none" strike="noStrike" dirty="0">
                           <a:effectLst/>
                         </a:rPr>
                         <a:t>BERT</a:t>
                       </a:r>
-                      <a:endParaRPr lang="en-US" sz="1400" b="0" i="0" u="none" strike="noStrike">
+                      <a:endParaRPr lang="en-US" sz="1400" b="0" i="0" u="none" strike="noStrike" dirty="0">
                         <a:solidFill>
                           <a:srgbClr val="000000"/>
                         </a:solidFill>
@@ -11351,7 +11852,7 @@
                   </a:ext>
                 </a:extLst>
               </a:tr>
-              <a:tr h="190500">
+              <a:tr h="157410">
                 <a:tc>
                   <a:txBody>
                     <a:bodyPr/>
@@ -11359,7 +11860,7 @@
                     <a:p>
                       <a:pPr algn="ctr" fontAlgn="b"/>
                       <a:r>
-                        <a:rPr lang="en-US" sz="1100" b="0" i="0" u="none" strike="noStrike" dirty="0" smtClean="0">
+                        <a:rPr lang="en-US" sz="1100" b="0" i="0" u="none" strike="noStrike" dirty="0">
                           <a:solidFill>
                             <a:schemeClr val="dk1"/>
                           </a:solidFill>
@@ -11523,7 +12024,7 @@
                   </a:ext>
                 </a:extLst>
               </a:tr>
-              <a:tr h="190500">
+              <a:tr h="157410">
                 <a:tc>
                   <a:txBody>
                     <a:bodyPr/>
@@ -11531,7 +12032,7 @@
                     <a:p>
                       <a:pPr algn="ctr" fontAlgn="b"/>
                       <a:r>
-                        <a:rPr lang="en-US" sz="1100" b="0" i="0" u="none" strike="noStrike" dirty="0" smtClean="0">
+                        <a:rPr lang="en-US" sz="1100" b="0" i="0" u="none" strike="noStrike" dirty="0">
                           <a:solidFill>
                             <a:srgbClr val="000000"/>
                           </a:solidFill>
@@ -11540,13 +12041,6 @@
                         </a:rPr>
                         <a:t>2</a:t>
                       </a:r>
-                      <a:endParaRPr lang="en-US" sz="1100" b="0" i="0" u="none" strike="noStrike" dirty="0">
-                        <a:solidFill>
-                          <a:srgbClr val="000000"/>
-                        </a:solidFill>
-                        <a:effectLst/>
-                        <a:latin typeface="Calibri" panose="020F0502020204030204" pitchFamily="34" charset="0"/>
-                      </a:endParaRPr>
                     </a:p>
                   </a:txBody>
                   <a:tcPr marL="9525" marR="9525" marT="9525" marB="0" anchor="b"/>
@@ -11695,7 +12189,7 @@
                   </a:ext>
                 </a:extLst>
               </a:tr>
-              <a:tr h="190500">
+              <a:tr h="157410">
                 <a:tc>
                   <a:txBody>
                     <a:bodyPr/>
@@ -11703,7 +12197,7 @@
                     <a:p>
                       <a:pPr algn="ctr" fontAlgn="b"/>
                       <a:r>
-                        <a:rPr lang="en-US" sz="1100" b="0" i="0" u="none" strike="noStrike" dirty="0" smtClean="0">
+                        <a:rPr lang="en-US" sz="1100" b="0" i="0" u="none" strike="noStrike" dirty="0">
                           <a:solidFill>
                             <a:schemeClr val="dk1"/>
                           </a:solidFill>
@@ -11867,7 +12361,7 @@
                   </a:ext>
                 </a:extLst>
               </a:tr>
-              <a:tr h="190500">
+              <a:tr h="157410">
                 <a:tc>
                   <a:txBody>
                     <a:bodyPr/>
@@ -11875,7 +12369,7 @@
                     <a:p>
                       <a:pPr algn="ctr" fontAlgn="b"/>
                       <a:r>
-                        <a:rPr lang="en-US" sz="1100" b="0" i="0" u="none" strike="noStrike" dirty="0" smtClean="0">
+                        <a:rPr lang="en-US" sz="1100" b="0" i="0" u="none" strike="noStrike" dirty="0">
                           <a:solidFill>
                             <a:srgbClr val="000000"/>
                           </a:solidFill>
@@ -11884,13 +12378,6 @@
                         </a:rPr>
                         <a:t>4</a:t>
                       </a:r>
-                      <a:endParaRPr lang="en-US" sz="1100" b="0" i="0" u="none" strike="noStrike" dirty="0">
-                        <a:solidFill>
-                          <a:srgbClr val="000000"/>
-                        </a:solidFill>
-                        <a:effectLst/>
-                        <a:latin typeface="Calibri" panose="020F0502020204030204" pitchFamily="34" charset="0"/>
-                      </a:endParaRPr>
                     </a:p>
                   </a:txBody>
                   <a:tcPr marL="9525" marR="9525" marT="9525" marB="0" anchor="b"/>
@@ -12039,7 +12526,7 @@
                   </a:ext>
                 </a:extLst>
               </a:tr>
-              <a:tr h="190500">
+              <a:tr h="157410">
                 <a:tc>
                   <a:txBody>
                     <a:bodyPr/>
@@ -12047,7 +12534,7 @@
                     <a:p>
                       <a:pPr algn="ctr" fontAlgn="b"/>
                       <a:r>
-                        <a:rPr lang="en-US" sz="1100" b="0" i="0" u="none" strike="noStrike" dirty="0" smtClean="0">
+                        <a:rPr lang="en-US" sz="1100" b="0" i="0" u="none" strike="noStrike" dirty="0">
                           <a:solidFill>
                             <a:srgbClr val="000000"/>
                           </a:solidFill>
@@ -12056,13 +12543,6 @@
                         </a:rPr>
                         <a:t>5</a:t>
                       </a:r>
-                      <a:endParaRPr lang="en-US" sz="1100" b="0" i="0" u="none" strike="noStrike" dirty="0">
-                        <a:solidFill>
-                          <a:srgbClr val="000000"/>
-                        </a:solidFill>
-                        <a:effectLst/>
-                        <a:latin typeface="Calibri" panose="020F0502020204030204" pitchFamily="34" charset="0"/>
-                      </a:endParaRPr>
                     </a:p>
                   </a:txBody>
                   <a:tcPr marL="9525" marR="9525" marT="9525" marB="0" anchor="b"/>
@@ -12211,7 +12691,7 @@
                   </a:ext>
                 </a:extLst>
               </a:tr>
-              <a:tr h="190500">
+              <a:tr h="157410">
                 <a:tc>
                   <a:txBody>
                     <a:bodyPr/>
@@ -12219,7 +12699,7 @@
                     <a:p>
                       <a:pPr algn="ctr" fontAlgn="b"/>
                       <a:r>
-                        <a:rPr lang="en-US" sz="1100" b="0" i="0" u="none" strike="noStrike" dirty="0" smtClean="0">
+                        <a:rPr lang="en-US" sz="1100" b="0" i="0" u="none" strike="noStrike" dirty="0">
                           <a:solidFill>
                             <a:srgbClr val="000000"/>
                           </a:solidFill>
@@ -12228,13 +12708,6 @@
                         </a:rPr>
                         <a:t>6</a:t>
                       </a:r>
-                      <a:endParaRPr lang="en-US" sz="1100" b="0" i="0" u="none" strike="noStrike" dirty="0">
-                        <a:solidFill>
-                          <a:srgbClr val="000000"/>
-                        </a:solidFill>
-                        <a:effectLst/>
-                        <a:latin typeface="Calibri" panose="020F0502020204030204" pitchFamily="34" charset="0"/>
-                      </a:endParaRPr>
                     </a:p>
                   </a:txBody>
                   <a:tcPr marL="9525" marR="9525" marT="9525" marB="0" anchor="b"/>
@@ -12383,7 +12856,7 @@
                   </a:ext>
                 </a:extLst>
               </a:tr>
-              <a:tr h="190500">
+              <a:tr h="157410">
                 <a:tc>
                   <a:txBody>
                     <a:bodyPr/>
@@ -12391,7 +12864,7 @@
                     <a:p>
                       <a:pPr algn="ctr" fontAlgn="b"/>
                       <a:r>
-                        <a:rPr lang="en-US" sz="1100" b="0" i="0" u="none" strike="noStrike" dirty="0" smtClean="0">
+                        <a:rPr lang="en-US" sz="1100" b="0" i="0" u="none" strike="noStrike" dirty="0">
                           <a:solidFill>
                             <a:srgbClr val="000000"/>
                           </a:solidFill>
@@ -12400,13 +12873,6 @@
                         </a:rPr>
                         <a:t>7</a:t>
                       </a:r>
-                      <a:endParaRPr lang="en-US" sz="1100" b="0" i="0" u="none" strike="noStrike" dirty="0">
-                        <a:solidFill>
-                          <a:srgbClr val="000000"/>
-                        </a:solidFill>
-                        <a:effectLst/>
-                        <a:latin typeface="Calibri" panose="020F0502020204030204" pitchFamily="34" charset="0"/>
-                      </a:endParaRPr>
                     </a:p>
                   </a:txBody>
                   <a:tcPr marL="9525" marR="9525" marT="9525" marB="0" anchor="b"/>
@@ -12555,7 +13021,7 @@
                   </a:ext>
                 </a:extLst>
               </a:tr>
-              <a:tr h="190500">
+              <a:tr h="157410">
                 <a:tc>
                   <a:txBody>
                     <a:bodyPr/>
@@ -12563,7 +13029,7 @@
                     <a:p>
                       <a:pPr algn="ctr" fontAlgn="b"/>
                       <a:r>
-                        <a:rPr lang="en-US" sz="1100" b="0" i="0" u="none" strike="noStrike" dirty="0" smtClean="0">
+                        <a:rPr lang="en-US" sz="1100" b="0" i="0" u="none" strike="noStrike" dirty="0">
                           <a:solidFill>
                             <a:srgbClr val="000000"/>
                           </a:solidFill>
@@ -12572,13 +13038,6 @@
                         </a:rPr>
                         <a:t>8</a:t>
                       </a:r>
-                      <a:endParaRPr lang="en-US" sz="1100" b="0" i="0" u="none" strike="noStrike" dirty="0">
-                        <a:solidFill>
-                          <a:srgbClr val="000000"/>
-                        </a:solidFill>
-                        <a:effectLst/>
-                        <a:latin typeface="Calibri" panose="020F0502020204030204" pitchFamily="34" charset="0"/>
-                      </a:endParaRPr>
                     </a:p>
                   </a:txBody>
                   <a:tcPr marL="9525" marR="9525" marT="9525" marB="0" anchor="b"/>
@@ -12727,7 +13186,7 @@
                   </a:ext>
                 </a:extLst>
               </a:tr>
-              <a:tr h="190500">
+              <a:tr h="157410">
                 <a:tc>
                   <a:txBody>
                     <a:bodyPr/>
@@ -12735,7 +13194,7 @@
                     <a:p>
                       <a:pPr algn="ctr" fontAlgn="b"/>
                       <a:r>
-                        <a:rPr lang="en-US" sz="1100" b="0" i="0" u="none" strike="noStrike" dirty="0" smtClean="0">
+                        <a:rPr lang="en-US" sz="1100" b="0" i="0" u="none" strike="noStrike" dirty="0">
                           <a:solidFill>
                             <a:srgbClr val="000000"/>
                           </a:solidFill>
@@ -12744,13 +13203,6 @@
                         </a:rPr>
                         <a:t>9</a:t>
                       </a:r>
-                      <a:endParaRPr lang="en-US" sz="1100" b="0" i="0" u="none" strike="noStrike" dirty="0">
-                        <a:solidFill>
-                          <a:srgbClr val="000000"/>
-                        </a:solidFill>
-                        <a:effectLst/>
-                        <a:latin typeface="Calibri" panose="020F0502020204030204" pitchFamily="34" charset="0"/>
-                      </a:endParaRPr>
                     </a:p>
                   </a:txBody>
                   <a:tcPr marL="9525" marR="9525" marT="9525" marB="0" anchor="b"/>
@@ -12899,7 +13351,7 @@
                   </a:ext>
                 </a:extLst>
               </a:tr>
-              <a:tr h="200025">
+              <a:tr h="165281">
                 <a:tc>
                   <a:txBody>
                     <a:bodyPr/>
@@ -12907,7 +13359,7 @@
                     <a:p>
                       <a:pPr algn="ctr" fontAlgn="b"/>
                       <a:r>
-                        <a:rPr lang="en-US" sz="1100" b="0" i="0" u="none" strike="noStrike" dirty="0" smtClean="0">
+                        <a:rPr lang="en-US" sz="1100" b="0" i="0" u="none" strike="noStrike" dirty="0">
                           <a:solidFill>
                             <a:srgbClr val="000000"/>
                           </a:solidFill>
@@ -12916,13 +13368,6 @@
                         </a:rPr>
                         <a:t>10</a:t>
                       </a:r>
-                      <a:endParaRPr lang="en-US" sz="1100" b="0" i="0" u="none" strike="noStrike" dirty="0">
-                        <a:solidFill>
-                          <a:srgbClr val="000000"/>
-                        </a:solidFill>
-                        <a:effectLst/>
-                        <a:latin typeface="Calibri" panose="020F0502020204030204" pitchFamily="34" charset="0"/>
-                      </a:endParaRPr>
                     </a:p>
                   </a:txBody>
                   <a:tcPr marL="9525" marR="9525" marT="9525" marB="0" anchor="b"/>
@@ -13071,7 +13516,7 @@
                   </a:ext>
                 </a:extLst>
               </a:tr>
-              <a:tr h="200025">
+              <a:tr h="165281">
                 <a:tc>
                   <a:txBody>
                     <a:bodyPr/>
@@ -13245,13 +13690,195 @@
       </p:graphicFrame>
       <p:sp>
         <p:nvSpPr>
+          <p:cNvPr id="6" name="Rectangle 5">
+            <a:extLst>
+              <a:ext uri="{FF2B5EF4-FFF2-40B4-BE49-F238E27FC236}">
+                <a16:creationId xmlns:a16="http://schemas.microsoft.com/office/drawing/2014/main" id="{D2A2443D-ED94-C697-C591-948D13D1D354}"/>
+              </a:ext>
+            </a:extLst>
+          </p:cNvPr>
+          <p:cNvSpPr/>
+          <p:nvPr/>
+        </p:nvSpPr>
+        <p:spPr>
+          <a:xfrm>
+            <a:off x="6268969" y="1856452"/>
+            <a:ext cx="1414941" cy="307777"/>
+          </a:xfrm>
+          <a:prstGeom prst="rect">
+            <a:avLst/>
+          </a:prstGeom>
+        </p:spPr>
+        <p:txBody>
+          <a:bodyPr wrap="square">
+            <a:spAutoFit/>
+          </a:bodyPr>
+          <a:lstStyle/>
+          <a:p>
+            <a:pPr algn="just" rtl="0"/>
+            <a:r>
+              <a:rPr lang="en-US" sz="1400" dirty="0">
+                <a:solidFill>
+                  <a:schemeClr val="accent6"/>
+                </a:solidFill>
+                <a:latin typeface="Times New Roman" panose="02020603050405020304" pitchFamily="18" charset="0"/>
+                <a:cs typeface="Times New Roman" panose="02020603050405020304" pitchFamily="18" charset="0"/>
+              </a:rPr>
+              <a:t>Precision results</a:t>
+            </a:r>
+          </a:p>
+        </p:txBody>
+      </p:sp>
+    </p:spTree>
+    <p:extLst>
+      <p:ext uri="{BB962C8B-B14F-4D97-AF65-F5344CB8AC3E}">
+        <p14:creationId xmlns:p14="http://schemas.microsoft.com/office/powerpoint/2010/main" val="197228145"/>
+      </p:ext>
+    </p:extLst>
+  </p:cSld>
+  <p:clrMapOvr>
+    <a:masterClrMapping/>
+  </p:clrMapOvr>
+</p:sld>
+</file>
+
+<file path=ppt/slides/slide14.xml><?xml version="1.0" encoding="utf-8"?>
+<p:sld xmlns:a="http://schemas.openxmlformats.org/drawingml/2006/main" xmlns:r="http://schemas.openxmlformats.org/officeDocument/2006/relationships" xmlns:p="http://schemas.openxmlformats.org/presentationml/2006/main">
+  <p:cSld>
+    <p:spTree>
+      <p:nvGrpSpPr>
+        <p:cNvPr id="1" name=""/>
+        <p:cNvGrpSpPr/>
+        <p:nvPr/>
+      </p:nvGrpSpPr>
+      <p:grpSpPr>
+        <a:xfrm>
+          <a:off x="0" y="0"/>
+          <a:ext cx="0" cy="0"/>
+          <a:chOff x="0" y="0"/>
+          <a:chExt cx="0" cy="0"/>
+        </a:xfrm>
+      </p:grpSpPr>
+      <p:sp>
+        <p:nvSpPr>
+          <p:cNvPr id="2" name="Rectangle 1">
+            <a:extLst>
+              <a:ext uri="{FF2B5EF4-FFF2-40B4-BE49-F238E27FC236}">
+                <a16:creationId xmlns:a16="http://schemas.microsoft.com/office/drawing/2014/main" id="{004381B8-2E97-E319-E348-DAD5ECD79470}"/>
+              </a:ext>
+            </a:extLst>
+          </p:cNvPr>
+          <p:cNvSpPr/>
+          <p:nvPr/>
+        </p:nvSpPr>
+        <p:spPr>
+          <a:xfrm>
+            <a:off x="3048000" y="226371"/>
+            <a:ext cx="6096000" cy="1261884"/>
+          </a:xfrm>
+          <a:prstGeom prst="rect">
+            <a:avLst/>
+          </a:prstGeom>
+        </p:spPr>
+        <p:txBody>
+          <a:bodyPr>
+            <a:spAutoFit/>
+          </a:bodyPr>
+          <a:lstStyle/>
+          <a:p>
+            <a:pPr algn="ctr"/>
+            <a:r>
+              <a:rPr lang="en-US" sz="4400" b="1" dirty="0">
+                <a:solidFill>
+                  <a:schemeClr val="accent6"/>
+                </a:solidFill>
+              </a:rPr>
+              <a:t>Project implementation</a:t>
+            </a:r>
+          </a:p>
+          <a:p>
+            <a:pPr algn="ctr" rtl="0"/>
+            <a:r>
+              <a:rPr lang="en-US" sz="3200" b="1" dirty="0">
+                <a:solidFill>
+                  <a:schemeClr val="accent6"/>
+                </a:solidFill>
+              </a:rPr>
+              <a:t>Details of the steps, part 4.2</a:t>
+            </a:r>
+          </a:p>
+        </p:txBody>
+      </p:sp>
+      <p:sp>
+        <p:nvSpPr>
+          <p:cNvPr id="3" name="Oval 2">
+            <a:extLst>
+              <a:ext uri="{FF2B5EF4-FFF2-40B4-BE49-F238E27FC236}">
+                <a16:creationId xmlns:a16="http://schemas.microsoft.com/office/drawing/2014/main" id="{FE125E05-4E52-A29D-C92C-8A7504B091C3}"/>
+              </a:ext>
+            </a:extLst>
+          </p:cNvPr>
+          <p:cNvSpPr/>
+          <p:nvPr/>
+        </p:nvSpPr>
+        <p:spPr>
+          <a:xfrm>
+            <a:off x="786291" y="2625097"/>
+            <a:ext cx="2065105" cy="854468"/>
+          </a:xfrm>
+          <a:prstGeom prst="ellipse">
+            <a:avLst/>
+          </a:prstGeom>
+          <a:solidFill>
+            <a:schemeClr val="accent3">
+              <a:lumMod val="75000"/>
+            </a:schemeClr>
+          </a:solidFill>
+          <a:ln>
+            <a:solidFill>
+              <a:schemeClr val="accent3">
+                <a:lumMod val="75000"/>
+              </a:schemeClr>
+            </a:solidFill>
+          </a:ln>
+        </p:spPr>
+        <p:style>
+          <a:lnRef idx="2">
+            <a:schemeClr val="accent1">
+              <a:shade val="50000"/>
+            </a:schemeClr>
+          </a:lnRef>
+          <a:fillRef idx="1">
+            <a:schemeClr val="accent1"/>
+          </a:fillRef>
+          <a:effectRef idx="0">
+            <a:schemeClr val="accent1"/>
+          </a:effectRef>
+          <a:fontRef idx="minor">
+            <a:schemeClr val="lt1"/>
+          </a:fontRef>
+        </p:style>
+        <p:txBody>
+          <a:bodyPr rtlCol="0" anchor="ctr"/>
+          <a:lstStyle/>
+          <a:p>
+            <a:pPr algn="ctr" rtl="0"/>
+            <a:r>
+              <a:rPr lang="en-US" dirty="0"/>
+              <a:t>5. Error analysis</a:t>
+            </a:r>
+          </a:p>
+        </p:txBody>
+      </p:sp>
+      <p:sp>
+        <p:nvSpPr>
           <p:cNvPr id="4" name="Rectangle 3"/>
           <p:cNvSpPr/>
           <p:nvPr/>
         </p:nvSpPr>
         <p:spPr>
           <a:xfrm>
-            <a:off x="842480" y="4315479"/>
+            <a:off x="786291" y="3983640"/>
             <a:ext cx="10705673" cy="2569934"/>
           </a:xfrm>
           <a:prstGeom prst="rect">
@@ -13268,56 +13895,56 @@
               <a:buAutoNum type="arabicPeriod"/>
             </a:pPr>
             <a:r>
-              <a:rPr lang="en-US" sz="1000" dirty="0" err="1" smtClean="0">
+              <a:rPr lang="en-US" sz="1000" dirty="0" err="1">
                 <a:latin typeface="Times New Roman" panose="02020603050405020304" pitchFamily="18" charset="0"/>
                 <a:cs typeface="Times New Roman" panose="02020603050405020304" pitchFamily="18" charset="0"/>
               </a:rPr>
               <a:t>Mun</a:t>
             </a:r>
             <a:r>
-              <a:rPr lang="en-US" sz="1000" dirty="0" smtClean="0">
+              <a:rPr lang="en-US" sz="1000" dirty="0">
                 <a:latin typeface="Times New Roman" panose="02020603050405020304" pitchFamily="18" charset="0"/>
                 <a:cs typeface="Times New Roman" panose="02020603050405020304" pitchFamily="18" charset="0"/>
               </a:rPr>
               <a:t>, Y. P., Khalid, H., &amp; </a:t>
             </a:r>
             <a:r>
-              <a:rPr lang="en-US" sz="1000" dirty="0" err="1" smtClean="0">
+              <a:rPr lang="en-US" sz="1000" dirty="0" err="1">
                 <a:latin typeface="Times New Roman" panose="02020603050405020304" pitchFamily="18" charset="0"/>
                 <a:cs typeface="Times New Roman" panose="02020603050405020304" pitchFamily="18" charset="0"/>
               </a:rPr>
               <a:t>Nadarajah</a:t>
             </a:r>
             <a:r>
-              <a:rPr lang="en-US" sz="1000" dirty="0" smtClean="0">
+              <a:rPr lang="en-US" sz="1000" dirty="0">
                 <a:latin typeface="Times New Roman" panose="02020603050405020304" pitchFamily="18" charset="0"/>
                 <a:cs typeface="Times New Roman" panose="02020603050405020304" pitchFamily="18" charset="0"/>
               </a:rPr>
               <a:t>, D. (2017). Millennials’ perception on mobile payment services in Malaysia. </a:t>
             </a:r>
             <a:r>
-              <a:rPr lang="en-US" sz="1000" i="1" dirty="0" smtClean="0">
+              <a:rPr lang="en-US" sz="1000" i="1" dirty="0">
                 <a:latin typeface="Times New Roman" panose="02020603050405020304" pitchFamily="18" charset="0"/>
                 <a:cs typeface="Times New Roman" panose="02020603050405020304" pitchFamily="18" charset="0"/>
               </a:rPr>
               <a:t>Procedia Computer Science</a:t>
             </a:r>
             <a:r>
-              <a:rPr lang="en-US" sz="1000" dirty="0" smtClean="0">
+              <a:rPr lang="en-US" sz="1000" dirty="0">
                 <a:latin typeface="Times New Roman" panose="02020603050405020304" pitchFamily="18" charset="0"/>
                 <a:cs typeface="Times New Roman" panose="02020603050405020304" pitchFamily="18" charset="0"/>
               </a:rPr>
               <a:t>, </a:t>
             </a:r>
             <a:r>
-              <a:rPr lang="en-US" sz="1000" i="1" dirty="0" smtClean="0">
+              <a:rPr lang="en-US" sz="1000" i="1" dirty="0">
                 <a:latin typeface="Times New Roman" panose="02020603050405020304" pitchFamily="18" charset="0"/>
                 <a:cs typeface="Times New Roman" panose="02020603050405020304" pitchFamily="18" charset="0"/>
               </a:rPr>
               <a:t>124</a:t>
             </a:r>
             <a:r>
-              <a:rPr lang="en-US" sz="1000" dirty="0" smtClean="0">
+              <a:rPr lang="en-US" sz="1000" dirty="0">
                 <a:latin typeface="Times New Roman" panose="02020603050405020304" pitchFamily="18" charset="0"/>
                 <a:cs typeface="Times New Roman" panose="02020603050405020304" pitchFamily="18" charset="0"/>
               </a:rPr>
@@ -13329,35 +13956,35 @@
               <a:buAutoNum type="arabicPeriod"/>
             </a:pPr>
             <a:r>
-              <a:rPr lang="en-US" sz="1000" dirty="0" smtClean="0">
+              <a:rPr lang="en-US" sz="1000" dirty="0">
                 <a:latin typeface="Times New Roman" panose="02020603050405020304" pitchFamily="18" charset="0"/>
                 <a:cs typeface="Times New Roman" panose="02020603050405020304" pitchFamily="18" charset="0"/>
               </a:rPr>
               <a:t>King, W. R., &amp; He, J. (2006). A meta-analysis of the technology acceptance model. </a:t>
             </a:r>
             <a:r>
-              <a:rPr lang="en-US" sz="1000" i="1" dirty="0" smtClean="0">
+              <a:rPr lang="en-US" sz="1000" i="1" dirty="0">
                 <a:latin typeface="Times New Roman" panose="02020603050405020304" pitchFamily="18" charset="0"/>
                 <a:cs typeface="Times New Roman" panose="02020603050405020304" pitchFamily="18" charset="0"/>
               </a:rPr>
               <a:t>Information &amp; management</a:t>
             </a:r>
             <a:r>
-              <a:rPr lang="en-US" sz="1000" dirty="0" smtClean="0">
+              <a:rPr lang="en-US" sz="1000" dirty="0">
                 <a:latin typeface="Times New Roman" panose="02020603050405020304" pitchFamily="18" charset="0"/>
                 <a:cs typeface="Times New Roman" panose="02020603050405020304" pitchFamily="18" charset="0"/>
               </a:rPr>
               <a:t>, </a:t>
             </a:r>
             <a:r>
-              <a:rPr lang="en-US" sz="1000" i="1" dirty="0" smtClean="0">
+              <a:rPr lang="en-US" sz="1000" i="1" dirty="0">
                 <a:latin typeface="Times New Roman" panose="02020603050405020304" pitchFamily="18" charset="0"/>
                 <a:cs typeface="Times New Roman" panose="02020603050405020304" pitchFamily="18" charset="0"/>
               </a:rPr>
               <a:t>43</a:t>
             </a:r>
             <a:r>
-              <a:rPr lang="en-US" sz="1000" dirty="0" smtClean="0">
+              <a:rPr lang="en-US" sz="1000" dirty="0">
                 <a:latin typeface="Times New Roman" panose="02020603050405020304" pitchFamily="18" charset="0"/>
                 <a:cs typeface="Times New Roman" panose="02020603050405020304" pitchFamily="18" charset="0"/>
               </a:rPr>
@@ -13369,35 +13996,35 @@
               <a:buAutoNum type="arabicPeriod"/>
             </a:pPr>
             <a:r>
-              <a:rPr lang="en-US" sz="1000" dirty="0" smtClean="0">
+              <a:rPr lang="en-US" sz="1000" dirty="0">
                 <a:latin typeface="Times New Roman" panose="02020603050405020304" pitchFamily="18" charset="0"/>
                 <a:cs typeface="Times New Roman" panose="02020603050405020304" pitchFamily="18" charset="0"/>
               </a:rPr>
               <a:t>Park, E. S., &amp; Park, M. S. (2020). Factors of the technology acceptance model for construction IT. </a:t>
             </a:r>
             <a:r>
-              <a:rPr lang="en-US" sz="1000" i="1" dirty="0" smtClean="0">
+              <a:rPr lang="en-US" sz="1000" i="1" dirty="0">
                 <a:latin typeface="Times New Roman" panose="02020603050405020304" pitchFamily="18" charset="0"/>
                 <a:cs typeface="Times New Roman" panose="02020603050405020304" pitchFamily="18" charset="0"/>
               </a:rPr>
               <a:t>Applied Sciences</a:t>
             </a:r>
             <a:r>
-              <a:rPr lang="en-US" sz="1000" dirty="0" smtClean="0">
+              <a:rPr lang="en-US" sz="1000" dirty="0">
                 <a:latin typeface="Times New Roman" panose="02020603050405020304" pitchFamily="18" charset="0"/>
                 <a:cs typeface="Times New Roman" panose="02020603050405020304" pitchFamily="18" charset="0"/>
               </a:rPr>
               <a:t>, </a:t>
             </a:r>
             <a:r>
-              <a:rPr lang="en-US" sz="1000" i="1" dirty="0" smtClean="0">
+              <a:rPr lang="en-US" sz="1000" i="1" dirty="0">
                 <a:latin typeface="Times New Roman" panose="02020603050405020304" pitchFamily="18" charset="0"/>
                 <a:cs typeface="Times New Roman" panose="02020603050405020304" pitchFamily="18" charset="0"/>
               </a:rPr>
               <a:t>10</a:t>
             </a:r>
             <a:r>
-              <a:rPr lang="en-US" sz="1000" dirty="0" smtClean="0">
+              <a:rPr lang="en-US" sz="1000" dirty="0">
                 <a:latin typeface="Times New Roman" panose="02020603050405020304" pitchFamily="18" charset="0"/>
                 <a:cs typeface="Times New Roman" panose="02020603050405020304" pitchFamily="18" charset="0"/>
               </a:rPr>
@@ -13409,35 +14036,35 @@
               <a:buAutoNum type="arabicPeriod"/>
             </a:pPr>
             <a:r>
-              <a:rPr lang="en-US" sz="1000" dirty="0" smtClean="0">
+              <a:rPr lang="en-US" sz="1000" dirty="0">
                 <a:latin typeface="Times New Roman" panose="02020603050405020304" pitchFamily="18" charset="0"/>
                 <a:cs typeface="Times New Roman" panose="02020603050405020304" pitchFamily="18" charset="0"/>
               </a:rPr>
               <a:t>Suki, N. M., &amp; Suki, N. M. (2011). Exploring the relationship between perceived usefulness, perceived ease of use, perceived enjoyment, attitude and subscribers’ intention towards using 3G mobile services. </a:t>
             </a:r>
             <a:r>
-              <a:rPr lang="en-US" sz="1000" i="1" dirty="0" smtClean="0">
+              <a:rPr lang="en-US" sz="1000" i="1" dirty="0">
                 <a:latin typeface="Times New Roman" panose="02020603050405020304" pitchFamily="18" charset="0"/>
                 <a:cs typeface="Times New Roman" panose="02020603050405020304" pitchFamily="18" charset="0"/>
               </a:rPr>
               <a:t>Journal of Information Technology Management</a:t>
             </a:r>
             <a:r>
-              <a:rPr lang="en-US" sz="1000" dirty="0" smtClean="0">
+              <a:rPr lang="en-US" sz="1000" dirty="0">
                 <a:latin typeface="Times New Roman" panose="02020603050405020304" pitchFamily="18" charset="0"/>
                 <a:cs typeface="Times New Roman" panose="02020603050405020304" pitchFamily="18" charset="0"/>
               </a:rPr>
               <a:t>, </a:t>
             </a:r>
             <a:r>
-              <a:rPr lang="en-US" sz="1000" i="1" dirty="0" smtClean="0">
+              <a:rPr lang="en-US" sz="1000" i="1" dirty="0">
                 <a:latin typeface="Times New Roman" panose="02020603050405020304" pitchFamily="18" charset="0"/>
                 <a:cs typeface="Times New Roman" panose="02020603050405020304" pitchFamily="18" charset="0"/>
               </a:rPr>
               <a:t>22</a:t>
             </a:r>
             <a:r>
-              <a:rPr lang="en-US" sz="1000" dirty="0" smtClean="0">
+              <a:rPr lang="en-US" sz="1000" dirty="0">
                 <a:latin typeface="Times New Roman" panose="02020603050405020304" pitchFamily="18" charset="0"/>
                 <a:cs typeface="Times New Roman" panose="02020603050405020304" pitchFamily="18" charset="0"/>
               </a:rPr>
@@ -13449,70 +14076,70 @@
               <a:buAutoNum type="arabicPeriod"/>
             </a:pPr>
             <a:r>
-              <a:rPr lang="en-US" sz="1000" dirty="0" err="1" smtClean="0">
+              <a:rPr lang="en-US" sz="1000" dirty="0" err="1">
                 <a:latin typeface="Times New Roman" panose="02020603050405020304" pitchFamily="18" charset="0"/>
                 <a:cs typeface="Times New Roman" panose="02020603050405020304" pitchFamily="18" charset="0"/>
               </a:rPr>
               <a:t>Mada</a:t>
             </a:r>
             <a:r>
-              <a:rPr lang="en-US" sz="1000" dirty="0" smtClean="0">
+              <a:rPr lang="en-US" sz="1000" dirty="0">
                 <a:latin typeface="Times New Roman" panose="02020603050405020304" pitchFamily="18" charset="0"/>
                 <a:cs typeface="Times New Roman" panose="02020603050405020304" pitchFamily="18" charset="0"/>
               </a:rPr>
               <a:t>, I. G. N. C. W., &amp; </a:t>
             </a:r>
             <a:r>
-              <a:rPr lang="en-US" sz="1000" dirty="0" err="1" smtClean="0">
+              <a:rPr lang="en-US" sz="1000" dirty="0" err="1">
                 <a:latin typeface="Times New Roman" panose="02020603050405020304" pitchFamily="18" charset="0"/>
                 <a:cs typeface="Times New Roman" panose="02020603050405020304" pitchFamily="18" charset="0"/>
               </a:rPr>
               <a:t>Putri</a:t>
             </a:r>
             <a:r>
-              <a:rPr lang="en-US" sz="1000" dirty="0" smtClean="0">
+              <a:rPr lang="en-US" sz="1000" dirty="0">
                 <a:latin typeface="Times New Roman" panose="02020603050405020304" pitchFamily="18" charset="0"/>
                 <a:cs typeface="Times New Roman" panose="02020603050405020304" pitchFamily="18" charset="0"/>
               </a:rPr>
               <a:t>, P. Y. A. (2021, April). Technology Acceptance Model (TAM) for Analysis of Online Banking use in PT Bank Rakyat Indonesia, </a:t>
             </a:r>
             <a:r>
-              <a:rPr lang="en-US" sz="1000" dirty="0" err="1" smtClean="0">
+              <a:rPr lang="en-US" sz="1000" dirty="0" err="1">
                 <a:latin typeface="Times New Roman" panose="02020603050405020304" pitchFamily="18" charset="0"/>
                 <a:cs typeface="Times New Roman" panose="02020603050405020304" pitchFamily="18" charset="0"/>
               </a:rPr>
               <a:t>Tbk</a:t>
             </a:r>
             <a:r>
-              <a:rPr lang="en-US" sz="1000" dirty="0" smtClean="0">
+              <a:rPr lang="en-US" sz="1000" dirty="0">
                 <a:latin typeface="Times New Roman" panose="02020603050405020304" pitchFamily="18" charset="0"/>
                 <a:cs typeface="Times New Roman" panose="02020603050405020304" pitchFamily="18" charset="0"/>
               </a:rPr>
               <a:t>. </a:t>
             </a:r>
             <a:r>
-              <a:rPr lang="en-US" sz="1000" dirty="0" err="1" smtClean="0">
+              <a:rPr lang="en-US" sz="1000" dirty="0" err="1">
                 <a:latin typeface="Times New Roman" panose="02020603050405020304" pitchFamily="18" charset="0"/>
                 <a:cs typeface="Times New Roman" panose="02020603050405020304" pitchFamily="18" charset="0"/>
               </a:rPr>
               <a:t>Gianyar</a:t>
             </a:r>
             <a:r>
-              <a:rPr lang="en-US" sz="1000" dirty="0" smtClean="0">
+              <a:rPr lang="en-US" sz="1000" dirty="0">
                 <a:latin typeface="Times New Roman" panose="02020603050405020304" pitchFamily="18" charset="0"/>
                 <a:cs typeface="Times New Roman" panose="02020603050405020304" pitchFamily="18" charset="0"/>
               </a:rPr>
               <a:t> Branch. In WARDS 2020: Proceedings of the 3rd </a:t>
             </a:r>
             <a:r>
-              <a:rPr lang="en-US" sz="1000" dirty="0" err="1" smtClean="0">
+              <a:rPr lang="en-US" sz="1000" dirty="0" err="1">
                 <a:latin typeface="Times New Roman" panose="02020603050405020304" pitchFamily="18" charset="0"/>
                 <a:cs typeface="Times New Roman" panose="02020603050405020304" pitchFamily="18" charset="0"/>
               </a:rPr>
               <a:t>Warmadewa</a:t>
             </a:r>
             <a:r>
-              <a:rPr lang="en-US" sz="1000" dirty="0" smtClean="0">
+              <a:rPr lang="en-US" sz="1000" dirty="0">
                 <a:latin typeface="Times New Roman" panose="02020603050405020304" pitchFamily="18" charset="0"/>
                 <a:cs typeface="Times New Roman" panose="02020603050405020304" pitchFamily="18" charset="0"/>
               </a:rPr>
@@ -13524,14 +14151,14 @@
               <a:buAutoNum type="arabicPeriod"/>
             </a:pPr>
             <a:r>
-              <a:rPr lang="en-US" sz="1000" dirty="0" err="1" smtClean="0">
+              <a:rPr lang="en-US" sz="1000" dirty="0" err="1">
                 <a:latin typeface="Times New Roman" panose="02020603050405020304" pitchFamily="18" charset="0"/>
                 <a:cs typeface="Times New Roman" panose="02020603050405020304" pitchFamily="18" charset="0"/>
               </a:rPr>
               <a:t>Masrom</a:t>
             </a:r>
             <a:r>
-              <a:rPr lang="en-US" sz="1000" dirty="0" smtClean="0">
+              <a:rPr lang="en-US" sz="1000" dirty="0">
                 <a:latin typeface="Times New Roman" panose="02020603050405020304" pitchFamily="18" charset="0"/>
                 <a:cs typeface="Times New Roman" panose="02020603050405020304" pitchFamily="18" charset="0"/>
               </a:rPr>
@@ -13543,112 +14170,112 @@
               <a:buAutoNum type="arabicPeriod"/>
             </a:pPr>
             <a:r>
-              <a:rPr lang="en-US" sz="1000" dirty="0" err="1" smtClean="0">
+              <a:rPr lang="en-US" sz="1000" dirty="0" err="1">
                 <a:latin typeface="Times New Roman" panose="02020603050405020304" pitchFamily="18" charset="0"/>
                 <a:cs typeface="Times New Roman" panose="02020603050405020304" pitchFamily="18" charset="0"/>
               </a:rPr>
               <a:t>Kusumadewi</a:t>
             </a:r>
             <a:r>
-              <a:rPr lang="en-US" sz="1000" dirty="0" smtClean="0">
+              <a:rPr lang="en-US" sz="1000" dirty="0">
                 <a:latin typeface="Times New Roman" panose="02020603050405020304" pitchFamily="18" charset="0"/>
                 <a:cs typeface="Times New Roman" panose="02020603050405020304" pitchFamily="18" charset="0"/>
               </a:rPr>
               <a:t>, A. N., </a:t>
             </a:r>
             <a:r>
-              <a:rPr lang="en-US" sz="1000" dirty="0" err="1" smtClean="0">
+              <a:rPr lang="en-US" sz="1000" dirty="0" err="1">
                 <a:latin typeface="Times New Roman" panose="02020603050405020304" pitchFamily="18" charset="0"/>
                 <a:cs typeface="Times New Roman" panose="02020603050405020304" pitchFamily="18" charset="0"/>
               </a:rPr>
               <a:t>Lubis</a:t>
             </a:r>
             <a:r>
-              <a:rPr lang="en-US" sz="1000" dirty="0" smtClean="0">
+              <a:rPr lang="en-US" sz="1000" dirty="0">
                 <a:latin typeface="Times New Roman" panose="02020603050405020304" pitchFamily="18" charset="0"/>
                 <a:cs typeface="Times New Roman" panose="02020603050405020304" pitchFamily="18" charset="0"/>
               </a:rPr>
               <a:t>, N. A., </a:t>
             </a:r>
             <a:r>
-              <a:rPr lang="en-US" sz="1000" dirty="0" err="1" smtClean="0">
+              <a:rPr lang="en-US" sz="1000" dirty="0" err="1">
                 <a:latin typeface="Times New Roman" panose="02020603050405020304" pitchFamily="18" charset="0"/>
                 <a:cs typeface="Times New Roman" panose="02020603050405020304" pitchFamily="18" charset="0"/>
               </a:rPr>
               <a:t>Prastiyo</a:t>
             </a:r>
             <a:r>
-              <a:rPr lang="en-US" sz="1000" dirty="0" smtClean="0">
+              <a:rPr lang="en-US" sz="1000" dirty="0">
                 <a:latin typeface="Times New Roman" panose="02020603050405020304" pitchFamily="18" charset="0"/>
                 <a:cs typeface="Times New Roman" panose="02020603050405020304" pitchFamily="18" charset="0"/>
               </a:rPr>
               <a:t>, R., &amp; Tamara, D. (2021). Technology Acceptance Model (TAM) in the Use of Online Learning Applications During the Covid-19 Pandemic for Parents of Elementary School Students. </a:t>
             </a:r>
             <a:r>
-              <a:rPr lang="en-US" sz="1000" i="1" dirty="0" err="1" smtClean="0">
+              <a:rPr lang="en-US" sz="1000" i="1" dirty="0" err="1">
                 <a:latin typeface="Times New Roman" panose="02020603050405020304" pitchFamily="18" charset="0"/>
                 <a:cs typeface="Times New Roman" panose="02020603050405020304" pitchFamily="18" charset="0"/>
               </a:rPr>
               <a:t>Edunesia</a:t>
             </a:r>
             <a:r>
-              <a:rPr lang="en-US" sz="1000" i="1" dirty="0" smtClean="0">
+              <a:rPr lang="en-US" sz="1000" i="1" dirty="0">
                 <a:latin typeface="Times New Roman" panose="02020603050405020304" pitchFamily="18" charset="0"/>
                 <a:cs typeface="Times New Roman" panose="02020603050405020304" pitchFamily="18" charset="0"/>
               </a:rPr>
               <a:t>: </a:t>
             </a:r>
             <a:r>
-              <a:rPr lang="en-US" sz="1000" i="1" dirty="0" err="1" smtClean="0">
+              <a:rPr lang="en-US" sz="1000" i="1" dirty="0" err="1">
                 <a:latin typeface="Times New Roman" panose="02020603050405020304" pitchFamily="18" charset="0"/>
                 <a:cs typeface="Times New Roman" panose="02020603050405020304" pitchFamily="18" charset="0"/>
               </a:rPr>
               <a:t>Jurnal</a:t>
             </a:r>
             <a:r>
-              <a:rPr lang="en-US" sz="1000" i="1" dirty="0" smtClean="0">
+              <a:rPr lang="en-US" sz="1000" i="1" dirty="0">
                 <a:latin typeface="Times New Roman" panose="02020603050405020304" pitchFamily="18" charset="0"/>
                 <a:cs typeface="Times New Roman" panose="02020603050405020304" pitchFamily="18" charset="0"/>
               </a:rPr>
               <a:t> </a:t>
             </a:r>
             <a:r>
-              <a:rPr lang="en-US" sz="1000" i="1" dirty="0" err="1" smtClean="0">
+              <a:rPr lang="en-US" sz="1000" i="1" dirty="0" err="1">
                 <a:latin typeface="Times New Roman" panose="02020603050405020304" pitchFamily="18" charset="0"/>
                 <a:cs typeface="Times New Roman" panose="02020603050405020304" pitchFamily="18" charset="0"/>
               </a:rPr>
               <a:t>Ilmiah</a:t>
             </a:r>
             <a:r>
-              <a:rPr lang="en-US" sz="1000" i="1" dirty="0" smtClean="0">
+              <a:rPr lang="en-US" sz="1000" i="1" dirty="0">
                 <a:latin typeface="Times New Roman" panose="02020603050405020304" pitchFamily="18" charset="0"/>
                 <a:cs typeface="Times New Roman" panose="02020603050405020304" pitchFamily="18" charset="0"/>
               </a:rPr>
               <a:t> </a:t>
             </a:r>
             <a:r>
-              <a:rPr lang="en-US" sz="1000" i="1" dirty="0" err="1" smtClean="0">
+              <a:rPr lang="en-US" sz="1000" i="1" dirty="0" err="1">
                 <a:latin typeface="Times New Roman" panose="02020603050405020304" pitchFamily="18" charset="0"/>
                 <a:cs typeface="Times New Roman" panose="02020603050405020304" pitchFamily="18" charset="0"/>
               </a:rPr>
               <a:t>Pendidikan</a:t>
             </a:r>
             <a:r>
-              <a:rPr lang="en-US" sz="1000" dirty="0" smtClean="0">
+              <a:rPr lang="en-US" sz="1000" dirty="0">
                 <a:latin typeface="Times New Roman" panose="02020603050405020304" pitchFamily="18" charset="0"/>
                 <a:cs typeface="Times New Roman" panose="02020603050405020304" pitchFamily="18" charset="0"/>
               </a:rPr>
               <a:t>, </a:t>
             </a:r>
             <a:r>
-              <a:rPr lang="en-US" sz="1000" i="1" dirty="0" smtClean="0">
+              <a:rPr lang="en-US" sz="1000" i="1" dirty="0">
                 <a:latin typeface="Times New Roman" panose="02020603050405020304" pitchFamily="18" charset="0"/>
                 <a:cs typeface="Times New Roman" panose="02020603050405020304" pitchFamily="18" charset="0"/>
               </a:rPr>
               <a:t>2</a:t>
             </a:r>
             <a:r>
-              <a:rPr lang="en-US" sz="1000" dirty="0" smtClean="0">
+              <a:rPr lang="en-US" sz="1000" dirty="0">
                 <a:latin typeface="Times New Roman" panose="02020603050405020304" pitchFamily="18" charset="0"/>
                 <a:cs typeface="Times New Roman" panose="02020603050405020304" pitchFamily="18" charset="0"/>
               </a:rPr>
@@ -13699,14 +14326,7 @@
                 <a:latin typeface="Times New Roman" panose="02020603050405020304" pitchFamily="18" charset="0"/>
                 <a:cs typeface="Times New Roman" panose="02020603050405020304" pitchFamily="18" charset="0"/>
               </a:rPr>
-              <a:t>, M. (2021). Development of TVET Teachers' Beliefs about Technology Enriched Instruction through Professional Development Workshops: Application of the Technology Acceptance Model. Journal of Technical Education and Training, 13(2), 25-33</a:t>
-            </a:r>
-            <a:r>
-              <a:rPr lang="en-US" sz="1000" dirty="0" smtClean="0">
-                <a:latin typeface="Times New Roman" panose="02020603050405020304" pitchFamily="18" charset="0"/>
-                <a:cs typeface="Times New Roman" panose="02020603050405020304" pitchFamily="18" charset="0"/>
-              </a:rPr>
-              <a:t>.</a:t>
+              <a:t>, M. (2021). Development of TVET Teachers' Beliefs about Technology Enriched Instruction through Professional Development Workshops: Application of the Technology Acceptance Model. Journal of Technical Education and Training, 13(2), 25-33.</a:t>
             </a:r>
           </a:p>
           <a:p>
@@ -13767,14 +14387,7 @@
                 <a:latin typeface="Times New Roman" panose="02020603050405020304" pitchFamily="18" charset="0"/>
                 <a:cs typeface="Times New Roman" panose="02020603050405020304" pitchFamily="18" charset="0"/>
               </a:rPr>
-              <a:t> Malaysia emotional quotient inventory among medical students in Malaysia. Sage Open, 6(2), 2158244016650240</a:t>
-            </a:r>
-            <a:r>
-              <a:rPr lang="en-US" sz="1000" dirty="0" smtClean="0">
-                <a:latin typeface="Times New Roman" panose="02020603050405020304" pitchFamily="18" charset="0"/>
-                <a:cs typeface="Times New Roman" panose="02020603050405020304" pitchFamily="18" charset="0"/>
-              </a:rPr>
-              <a:t>.</a:t>
+              <a:t> Malaysia emotional quotient inventory among medical students in Malaysia. Sage Open, 6(2), 2158244016650240.</a:t>
             </a:r>
           </a:p>
           <a:p>
@@ -13800,35 +14413,877 @@
           </a:p>
         </p:txBody>
       </p:sp>
+      <p:sp>
+        <p:nvSpPr>
+          <p:cNvPr id="9" name="Rectangle 8">
+            <a:extLst>
+              <a:ext uri="{FF2B5EF4-FFF2-40B4-BE49-F238E27FC236}">
+                <a16:creationId xmlns:a16="http://schemas.microsoft.com/office/drawing/2014/main" id="{CE9DB878-FDC1-F41F-CF0A-63E3907419B7}"/>
+              </a:ext>
+            </a:extLst>
+          </p:cNvPr>
+          <p:cNvSpPr/>
+          <p:nvPr/>
+        </p:nvSpPr>
+        <p:spPr>
+          <a:xfrm>
+            <a:off x="7851510" y="1681890"/>
+            <a:ext cx="1414941" cy="307777"/>
+          </a:xfrm>
+          <a:prstGeom prst="rect">
+            <a:avLst/>
+          </a:prstGeom>
+        </p:spPr>
+        <p:txBody>
+          <a:bodyPr wrap="square">
+            <a:spAutoFit/>
+          </a:bodyPr>
+          <a:lstStyle/>
+          <a:p>
+            <a:pPr algn="ctr" rtl="0"/>
+            <a:r>
+              <a:rPr lang="en-US" sz="1400" dirty="0">
+                <a:solidFill>
+                  <a:schemeClr val="accent6"/>
+                </a:solidFill>
+                <a:latin typeface="Times New Roman" panose="02020603050405020304" pitchFamily="18" charset="0"/>
+                <a:cs typeface="Times New Roman" panose="02020603050405020304" pitchFamily="18" charset="0"/>
+              </a:rPr>
+              <a:t>GPT2</a:t>
+            </a:r>
+          </a:p>
+        </p:txBody>
+      </p:sp>
+      <p:sp>
+        <p:nvSpPr>
+          <p:cNvPr id="10" name="Rectangle 9">
+            <a:extLst>
+              <a:ext uri="{FF2B5EF4-FFF2-40B4-BE49-F238E27FC236}">
+                <a16:creationId xmlns:a16="http://schemas.microsoft.com/office/drawing/2014/main" id="{A269407C-18A9-128B-8967-067E0E9A9C48}"/>
+              </a:ext>
+            </a:extLst>
+          </p:cNvPr>
+          <p:cNvSpPr/>
+          <p:nvPr/>
+        </p:nvSpPr>
+        <p:spPr>
+          <a:xfrm>
+            <a:off x="3987432" y="1681890"/>
+            <a:ext cx="1414941" cy="307777"/>
+          </a:xfrm>
+          <a:prstGeom prst="rect">
+            <a:avLst/>
+          </a:prstGeom>
+        </p:spPr>
+        <p:txBody>
+          <a:bodyPr wrap="square">
+            <a:spAutoFit/>
+          </a:bodyPr>
+          <a:lstStyle/>
+          <a:p>
+            <a:pPr algn="ctr" rtl="0"/>
+            <a:r>
+              <a:rPr lang="en-US" sz="1400" dirty="0">
+                <a:solidFill>
+                  <a:schemeClr val="accent6"/>
+                </a:solidFill>
+                <a:latin typeface="Times New Roman" panose="02020603050405020304" pitchFamily="18" charset="0"/>
+                <a:cs typeface="Times New Roman" panose="02020603050405020304" pitchFamily="18" charset="0"/>
+              </a:rPr>
+              <a:t>Bert</a:t>
+            </a:r>
+          </a:p>
+        </p:txBody>
+      </p:sp>
+      <p:graphicFrame>
+        <p:nvGraphicFramePr>
+          <p:cNvPr id="11" name="Table 10">
+            <a:extLst>
+              <a:ext uri="{FF2B5EF4-FFF2-40B4-BE49-F238E27FC236}">
+                <a16:creationId xmlns:a16="http://schemas.microsoft.com/office/drawing/2014/main" id="{D65E87CB-DB20-846B-E16A-FF5A0139D85D}"/>
+              </a:ext>
+            </a:extLst>
+          </p:cNvPr>
+          <p:cNvGraphicFramePr>
+            <a:graphicFrameLocks noGrp="1"/>
+          </p:cNvGraphicFramePr>
+          <p:nvPr>
+            <p:extLst>
+              <p:ext uri="{D42A27DB-BD31-4B8C-83A1-F6EECF244321}">
+                <p14:modId xmlns:p14="http://schemas.microsoft.com/office/powerpoint/2010/main" val="551509172"/>
+              </p:ext>
+            </p:extLst>
+          </p:nvPr>
+        </p:nvGraphicFramePr>
+        <p:xfrm>
+          <a:off x="7511230" y="2109815"/>
+          <a:ext cx="2095500" cy="1143000"/>
+        </p:xfrm>
+        <a:graphic>
+          <a:graphicData uri="http://schemas.openxmlformats.org/drawingml/2006/table">
+            <a:tbl>
+              <a:tblPr>
+                <a:tableStyleId>{5C22544A-7EE6-4342-B048-85BDC9FD1C3A}</a:tableStyleId>
+              </a:tblPr>
+              <a:tblGrid>
+                <a:gridCol w="1130300">
+                  <a:extLst>
+                    <a:ext uri="{9D8B030D-6E8A-4147-A177-3AD203B41FA5}">
+                      <a16:colId xmlns:a16="http://schemas.microsoft.com/office/drawing/2014/main" val="3097579309"/>
+                    </a:ext>
+                  </a:extLst>
+                </a:gridCol>
+                <a:gridCol w="965200">
+                  <a:extLst>
+                    <a:ext uri="{9D8B030D-6E8A-4147-A177-3AD203B41FA5}">
+                      <a16:colId xmlns:a16="http://schemas.microsoft.com/office/drawing/2014/main" val="1993896237"/>
+                    </a:ext>
+                  </a:extLst>
+                </a:gridCol>
+              </a:tblGrid>
+              <a:tr h="190500">
+                <a:tc>
+                  <a:txBody>
+                    <a:bodyPr/>
+                    <a:lstStyle/>
+                    <a:p>
+                      <a:pPr algn="l" fontAlgn="b"/>
+                      <a:r>
+                        <a:rPr lang="en-US" sz="1100" u="none" strike="noStrike">
+                          <a:effectLst/>
+                        </a:rPr>
+                        <a:t>Introdaction</a:t>
+                      </a:r>
+                      <a:endParaRPr lang="en-US" sz="1100" b="0" i="0" u="none" strike="noStrike">
+                        <a:solidFill>
+                          <a:srgbClr val="000000"/>
+                        </a:solidFill>
+                        <a:effectLst/>
+                        <a:latin typeface="Calibri" panose="020F0502020204030204" pitchFamily="34" charset="0"/>
+                      </a:endParaRPr>
+                    </a:p>
+                  </a:txBody>
+                  <a:tcPr marL="9525" marR="9525" marT="9525" marB="0" anchor="b"/>
+                </a:tc>
+                <a:tc>
+                  <a:txBody>
+                    <a:bodyPr/>
+                    <a:lstStyle/>
+                    <a:p>
+                      <a:pPr algn="ctr" fontAlgn="b"/>
+                      <a:r>
+                        <a:rPr lang="en-US" sz="1100" u="none" strike="noStrike">
+                          <a:effectLst/>
+                        </a:rPr>
+                        <a:t>70%</a:t>
+                      </a:r>
+                      <a:endParaRPr lang="en-US" sz="1100" b="0" i="0" u="none" strike="noStrike">
+                        <a:solidFill>
+                          <a:srgbClr val="000000"/>
+                        </a:solidFill>
+                        <a:effectLst/>
+                        <a:latin typeface="Calibri" panose="020F0502020204030204" pitchFamily="34" charset="0"/>
+                      </a:endParaRPr>
+                    </a:p>
+                  </a:txBody>
+                  <a:tcPr marL="9525" marR="9525" marT="9525" marB="0" anchor="b"/>
+                </a:tc>
+                <a:extLst>
+                  <a:ext uri="{0D108BD9-81ED-4DB2-BD59-A6C34878D82A}">
+                    <a16:rowId xmlns:a16="http://schemas.microsoft.com/office/drawing/2014/main" val="1225424114"/>
+                  </a:ext>
+                </a:extLst>
+              </a:tr>
+              <a:tr h="190500">
+                <a:tc>
+                  <a:txBody>
+                    <a:bodyPr/>
+                    <a:lstStyle/>
+                    <a:p>
+                      <a:pPr algn="l" fontAlgn="b"/>
+                      <a:r>
+                        <a:rPr lang="en-US" sz="1100" u="none" strike="noStrike">
+                          <a:effectLst/>
+                        </a:rPr>
+                        <a:t>Literaure review</a:t>
+                      </a:r>
+                      <a:endParaRPr lang="en-US" sz="1100" b="0" i="0" u="none" strike="noStrike">
+                        <a:solidFill>
+                          <a:srgbClr val="000000"/>
+                        </a:solidFill>
+                        <a:effectLst/>
+                        <a:latin typeface="Calibri" panose="020F0502020204030204" pitchFamily="34" charset="0"/>
+                      </a:endParaRPr>
+                    </a:p>
+                  </a:txBody>
+                  <a:tcPr marL="9525" marR="9525" marT="9525" marB="0" anchor="b"/>
+                </a:tc>
+                <a:tc>
+                  <a:txBody>
+                    <a:bodyPr/>
+                    <a:lstStyle/>
+                    <a:p>
+                      <a:pPr algn="ctr" fontAlgn="b"/>
+                      <a:r>
+                        <a:rPr lang="en-US" sz="1100" u="none" strike="noStrike" dirty="0">
+                          <a:effectLst/>
+                        </a:rPr>
+                        <a:t>20%</a:t>
+                      </a:r>
+                      <a:endParaRPr lang="en-US" sz="1100" b="0" i="0" u="none" strike="noStrike" dirty="0">
+                        <a:solidFill>
+                          <a:srgbClr val="000000"/>
+                        </a:solidFill>
+                        <a:effectLst/>
+                        <a:latin typeface="Calibri" panose="020F0502020204030204" pitchFamily="34" charset="0"/>
+                      </a:endParaRPr>
+                    </a:p>
+                  </a:txBody>
+                  <a:tcPr marL="9525" marR="9525" marT="9525" marB="0" anchor="b"/>
+                </a:tc>
+                <a:extLst>
+                  <a:ext uri="{0D108BD9-81ED-4DB2-BD59-A6C34878D82A}">
+                    <a16:rowId xmlns:a16="http://schemas.microsoft.com/office/drawing/2014/main" val="2004719666"/>
+                  </a:ext>
+                </a:extLst>
+              </a:tr>
+              <a:tr h="190500">
+                <a:tc>
+                  <a:txBody>
+                    <a:bodyPr/>
+                    <a:lstStyle/>
+                    <a:p>
+                      <a:pPr algn="l" fontAlgn="b"/>
+                      <a:r>
+                        <a:rPr lang="en-US" sz="1100" u="none" strike="noStrike">
+                          <a:effectLst/>
+                        </a:rPr>
+                        <a:t>Methodology</a:t>
+                      </a:r>
+                      <a:endParaRPr lang="en-US" sz="1100" b="0" i="0" u="none" strike="noStrike">
+                        <a:solidFill>
+                          <a:srgbClr val="000000"/>
+                        </a:solidFill>
+                        <a:effectLst/>
+                        <a:latin typeface="Calibri" panose="020F0502020204030204" pitchFamily="34" charset="0"/>
+                      </a:endParaRPr>
+                    </a:p>
+                  </a:txBody>
+                  <a:tcPr marL="9525" marR="9525" marT="9525" marB="0" anchor="b"/>
+                </a:tc>
+                <a:tc>
+                  <a:txBody>
+                    <a:bodyPr/>
+                    <a:lstStyle/>
+                    <a:p>
+                      <a:pPr algn="ctr" fontAlgn="b"/>
+                      <a:r>
+                        <a:rPr lang="en-US" sz="1100" u="none" strike="noStrike">
+                          <a:effectLst/>
+                        </a:rPr>
+                        <a:t>60%</a:t>
+                      </a:r>
+                      <a:endParaRPr lang="en-US" sz="1100" b="0" i="0" u="none" strike="noStrike">
+                        <a:solidFill>
+                          <a:srgbClr val="000000"/>
+                        </a:solidFill>
+                        <a:effectLst/>
+                        <a:latin typeface="Calibri" panose="020F0502020204030204" pitchFamily="34" charset="0"/>
+                      </a:endParaRPr>
+                    </a:p>
+                  </a:txBody>
+                  <a:tcPr marL="9525" marR="9525" marT="9525" marB="0" anchor="b"/>
+                </a:tc>
+                <a:extLst>
+                  <a:ext uri="{0D108BD9-81ED-4DB2-BD59-A6C34878D82A}">
+                    <a16:rowId xmlns:a16="http://schemas.microsoft.com/office/drawing/2014/main" val="512600787"/>
+                  </a:ext>
+                </a:extLst>
+              </a:tr>
+              <a:tr h="190500">
+                <a:tc>
+                  <a:txBody>
+                    <a:bodyPr/>
+                    <a:lstStyle/>
+                    <a:p>
+                      <a:pPr algn="l" fontAlgn="b"/>
+                      <a:r>
+                        <a:rPr lang="en-US" sz="1100" u="none" strike="noStrike">
+                          <a:effectLst/>
+                        </a:rPr>
+                        <a:t>Results</a:t>
+                      </a:r>
+                      <a:endParaRPr lang="en-US" sz="1100" b="0" i="0" u="none" strike="noStrike">
+                        <a:solidFill>
+                          <a:srgbClr val="000000"/>
+                        </a:solidFill>
+                        <a:effectLst/>
+                        <a:latin typeface="Calibri" panose="020F0502020204030204" pitchFamily="34" charset="0"/>
+                      </a:endParaRPr>
+                    </a:p>
+                  </a:txBody>
+                  <a:tcPr marL="9525" marR="9525" marT="9525" marB="0" anchor="b"/>
+                </a:tc>
+                <a:tc>
+                  <a:txBody>
+                    <a:bodyPr/>
+                    <a:lstStyle/>
+                    <a:p>
+                      <a:pPr algn="ctr" fontAlgn="b"/>
+                      <a:r>
+                        <a:rPr lang="en-US" sz="1100" u="none" strike="noStrike">
+                          <a:effectLst/>
+                        </a:rPr>
+                        <a:t>30%</a:t>
+                      </a:r>
+                      <a:endParaRPr lang="en-US" sz="1100" b="0" i="0" u="none" strike="noStrike">
+                        <a:solidFill>
+                          <a:srgbClr val="000000"/>
+                        </a:solidFill>
+                        <a:effectLst/>
+                        <a:latin typeface="Calibri" panose="020F0502020204030204" pitchFamily="34" charset="0"/>
+                      </a:endParaRPr>
+                    </a:p>
+                  </a:txBody>
+                  <a:tcPr marL="9525" marR="9525" marT="9525" marB="0" anchor="b"/>
+                </a:tc>
+                <a:extLst>
+                  <a:ext uri="{0D108BD9-81ED-4DB2-BD59-A6C34878D82A}">
+                    <a16:rowId xmlns:a16="http://schemas.microsoft.com/office/drawing/2014/main" val="123021619"/>
+                  </a:ext>
+                </a:extLst>
+              </a:tr>
+              <a:tr h="190500">
+                <a:tc>
+                  <a:txBody>
+                    <a:bodyPr/>
+                    <a:lstStyle/>
+                    <a:p>
+                      <a:pPr algn="l" fontAlgn="b"/>
+                      <a:r>
+                        <a:rPr lang="en-US" sz="1100" u="none" strike="noStrike">
+                          <a:effectLst/>
+                        </a:rPr>
+                        <a:t>Conclusions</a:t>
+                      </a:r>
+                      <a:endParaRPr lang="en-US" sz="1100" b="0" i="0" u="none" strike="noStrike">
+                        <a:solidFill>
+                          <a:srgbClr val="000000"/>
+                        </a:solidFill>
+                        <a:effectLst/>
+                        <a:latin typeface="Calibri" panose="020F0502020204030204" pitchFamily="34" charset="0"/>
+                      </a:endParaRPr>
+                    </a:p>
+                  </a:txBody>
+                  <a:tcPr marL="9525" marR="9525" marT="9525" marB="0" anchor="b"/>
+                </a:tc>
+                <a:tc>
+                  <a:txBody>
+                    <a:bodyPr/>
+                    <a:lstStyle/>
+                    <a:p>
+                      <a:pPr algn="ctr" fontAlgn="b"/>
+                      <a:r>
+                        <a:rPr lang="en-US" sz="1100" u="none" strike="noStrike">
+                          <a:effectLst/>
+                        </a:rPr>
+                        <a:t>50%</a:t>
+                      </a:r>
+                      <a:endParaRPr lang="en-US" sz="1100" b="0" i="0" u="none" strike="noStrike">
+                        <a:solidFill>
+                          <a:srgbClr val="000000"/>
+                        </a:solidFill>
+                        <a:effectLst/>
+                        <a:latin typeface="Calibri" panose="020F0502020204030204" pitchFamily="34" charset="0"/>
+                      </a:endParaRPr>
+                    </a:p>
+                  </a:txBody>
+                  <a:tcPr marL="9525" marR="9525" marT="9525" marB="0" anchor="b"/>
+                </a:tc>
+                <a:extLst>
+                  <a:ext uri="{0D108BD9-81ED-4DB2-BD59-A6C34878D82A}">
+                    <a16:rowId xmlns:a16="http://schemas.microsoft.com/office/drawing/2014/main" val="104056099"/>
+                  </a:ext>
+                </a:extLst>
+              </a:tr>
+              <a:tr h="190500">
+                <a:tc>
+                  <a:txBody>
+                    <a:bodyPr/>
+                    <a:lstStyle/>
+                    <a:p>
+                      <a:pPr algn="l" fontAlgn="b"/>
+                      <a:r>
+                        <a:rPr lang="en-US" sz="1100" u="none" strike="noStrike">
+                          <a:effectLst/>
+                        </a:rPr>
+                        <a:t>Discussion</a:t>
+                      </a:r>
+                      <a:endParaRPr lang="en-US" sz="1100" b="0" i="0" u="none" strike="noStrike">
+                        <a:solidFill>
+                          <a:srgbClr val="000000"/>
+                        </a:solidFill>
+                        <a:effectLst/>
+                        <a:latin typeface="Calibri" panose="020F0502020204030204" pitchFamily="34" charset="0"/>
+                      </a:endParaRPr>
+                    </a:p>
+                  </a:txBody>
+                  <a:tcPr marL="9525" marR="9525" marT="9525" marB="0" anchor="b"/>
+                </a:tc>
+                <a:tc>
+                  <a:txBody>
+                    <a:bodyPr/>
+                    <a:lstStyle/>
+                    <a:p>
+                      <a:pPr algn="ctr" fontAlgn="b"/>
+                      <a:r>
+                        <a:rPr lang="en-US" sz="1100" u="none" strike="noStrike" dirty="0">
+                          <a:effectLst/>
+                        </a:rPr>
+                        <a:t>30%</a:t>
+                      </a:r>
+                      <a:endParaRPr lang="en-US" sz="1100" b="0" i="0" u="none" strike="noStrike" dirty="0">
+                        <a:solidFill>
+                          <a:srgbClr val="000000"/>
+                        </a:solidFill>
+                        <a:effectLst/>
+                        <a:latin typeface="Calibri" panose="020F0502020204030204" pitchFamily="34" charset="0"/>
+                      </a:endParaRPr>
+                    </a:p>
+                  </a:txBody>
+                  <a:tcPr marL="9525" marR="9525" marT="9525" marB="0" anchor="b"/>
+                </a:tc>
+                <a:extLst>
+                  <a:ext uri="{0D108BD9-81ED-4DB2-BD59-A6C34878D82A}">
+                    <a16:rowId xmlns:a16="http://schemas.microsoft.com/office/drawing/2014/main" val="1472326194"/>
+                  </a:ext>
+                </a:extLst>
+              </a:tr>
+            </a:tbl>
+          </a:graphicData>
+        </a:graphic>
+      </p:graphicFrame>
+      <p:graphicFrame>
+        <p:nvGraphicFramePr>
+          <p:cNvPr id="12" name="Table 11">
+            <a:extLst>
+              <a:ext uri="{FF2B5EF4-FFF2-40B4-BE49-F238E27FC236}">
+                <a16:creationId xmlns:a16="http://schemas.microsoft.com/office/drawing/2014/main" id="{76011F5B-4EBC-3D54-1950-4BEF26C4894A}"/>
+              </a:ext>
+            </a:extLst>
+          </p:cNvPr>
+          <p:cNvGraphicFramePr>
+            <a:graphicFrameLocks noGrp="1"/>
+          </p:cNvGraphicFramePr>
+          <p:nvPr>
+            <p:extLst>
+              <p:ext uri="{D42A27DB-BD31-4B8C-83A1-F6EECF244321}">
+                <p14:modId xmlns:p14="http://schemas.microsoft.com/office/powerpoint/2010/main" val="1360532432"/>
+              </p:ext>
+            </p:extLst>
+          </p:nvPr>
+        </p:nvGraphicFramePr>
+        <p:xfrm>
+          <a:off x="3501922" y="2109815"/>
+          <a:ext cx="2489200" cy="1143000"/>
+        </p:xfrm>
+        <a:graphic>
+          <a:graphicData uri="http://schemas.openxmlformats.org/drawingml/2006/table">
+            <a:tbl>
+              <a:tblPr>
+                <a:tableStyleId>{5C22544A-7EE6-4342-B048-85BDC9FD1C3A}</a:tableStyleId>
+              </a:tblPr>
+              <a:tblGrid>
+                <a:gridCol w="1244600">
+                  <a:extLst>
+                    <a:ext uri="{9D8B030D-6E8A-4147-A177-3AD203B41FA5}">
+                      <a16:colId xmlns:a16="http://schemas.microsoft.com/office/drawing/2014/main" val="711947845"/>
+                    </a:ext>
+                  </a:extLst>
+                </a:gridCol>
+                <a:gridCol w="1244600">
+                  <a:extLst>
+                    <a:ext uri="{9D8B030D-6E8A-4147-A177-3AD203B41FA5}">
+                      <a16:colId xmlns:a16="http://schemas.microsoft.com/office/drawing/2014/main" val="3395218832"/>
+                    </a:ext>
+                  </a:extLst>
+                </a:gridCol>
+              </a:tblGrid>
+              <a:tr h="190500">
+                <a:tc>
+                  <a:txBody>
+                    <a:bodyPr/>
+                    <a:lstStyle/>
+                    <a:p>
+                      <a:pPr algn="l" fontAlgn="b"/>
+                      <a:r>
+                        <a:rPr lang="en-US" sz="1100" u="none" strike="noStrike">
+                          <a:effectLst/>
+                        </a:rPr>
+                        <a:t>Introdaction</a:t>
+                      </a:r>
+                      <a:endParaRPr lang="en-US" sz="1100" b="0" i="0" u="none" strike="noStrike">
+                        <a:solidFill>
+                          <a:srgbClr val="000000"/>
+                        </a:solidFill>
+                        <a:effectLst/>
+                        <a:latin typeface="Calibri" panose="020F0502020204030204" pitchFamily="34" charset="0"/>
+                      </a:endParaRPr>
+                    </a:p>
+                  </a:txBody>
+                  <a:tcPr marL="9525" marR="9525" marT="9525" marB="0" anchor="b"/>
+                </a:tc>
+                <a:tc>
+                  <a:txBody>
+                    <a:bodyPr/>
+                    <a:lstStyle/>
+                    <a:p>
+                      <a:pPr algn="ctr" fontAlgn="ctr"/>
+                      <a:r>
+                        <a:rPr lang="en-US" sz="1100" u="none" strike="noStrike">
+                          <a:effectLst/>
+                        </a:rPr>
+                        <a:t>90%</a:t>
+                      </a:r>
+                      <a:endParaRPr lang="en-US" sz="1100" b="0" i="0" u="none" strike="noStrike">
+                        <a:solidFill>
+                          <a:srgbClr val="000000"/>
+                        </a:solidFill>
+                        <a:effectLst/>
+                        <a:latin typeface="Calibri" panose="020F0502020204030204" pitchFamily="34" charset="0"/>
+                      </a:endParaRPr>
+                    </a:p>
+                  </a:txBody>
+                  <a:tcPr marL="9525" marR="9525" marT="9525" marB="0" anchor="ctr"/>
+                </a:tc>
+                <a:extLst>
+                  <a:ext uri="{0D108BD9-81ED-4DB2-BD59-A6C34878D82A}">
+                    <a16:rowId xmlns:a16="http://schemas.microsoft.com/office/drawing/2014/main" val="905789431"/>
+                  </a:ext>
+                </a:extLst>
+              </a:tr>
+              <a:tr h="190500">
+                <a:tc>
+                  <a:txBody>
+                    <a:bodyPr/>
+                    <a:lstStyle/>
+                    <a:p>
+                      <a:pPr algn="l" fontAlgn="b"/>
+                      <a:r>
+                        <a:rPr lang="en-US" sz="1100" u="none" strike="noStrike">
+                          <a:effectLst/>
+                        </a:rPr>
+                        <a:t>Literaure review</a:t>
+                      </a:r>
+                      <a:endParaRPr lang="en-US" sz="1100" b="0" i="0" u="none" strike="noStrike">
+                        <a:solidFill>
+                          <a:srgbClr val="000000"/>
+                        </a:solidFill>
+                        <a:effectLst/>
+                        <a:latin typeface="Calibri" panose="020F0502020204030204" pitchFamily="34" charset="0"/>
+                      </a:endParaRPr>
+                    </a:p>
+                  </a:txBody>
+                  <a:tcPr marL="9525" marR="9525" marT="9525" marB="0" anchor="b"/>
+                </a:tc>
+                <a:tc>
+                  <a:txBody>
+                    <a:bodyPr/>
+                    <a:lstStyle/>
+                    <a:p>
+                      <a:pPr algn="ctr" fontAlgn="b"/>
+                      <a:r>
+                        <a:rPr lang="en-US" sz="1100" u="none" strike="noStrike">
+                          <a:effectLst/>
+                        </a:rPr>
+                        <a:t>20%</a:t>
+                      </a:r>
+                      <a:endParaRPr lang="en-US" sz="1100" b="0" i="0" u="none" strike="noStrike">
+                        <a:solidFill>
+                          <a:srgbClr val="000000"/>
+                        </a:solidFill>
+                        <a:effectLst/>
+                        <a:latin typeface="Calibri" panose="020F0502020204030204" pitchFamily="34" charset="0"/>
+                      </a:endParaRPr>
+                    </a:p>
+                  </a:txBody>
+                  <a:tcPr marL="9525" marR="9525" marT="9525" marB="0" anchor="b"/>
+                </a:tc>
+                <a:extLst>
+                  <a:ext uri="{0D108BD9-81ED-4DB2-BD59-A6C34878D82A}">
+                    <a16:rowId xmlns:a16="http://schemas.microsoft.com/office/drawing/2014/main" val="2069110690"/>
+                  </a:ext>
+                </a:extLst>
+              </a:tr>
+              <a:tr h="190500">
+                <a:tc>
+                  <a:txBody>
+                    <a:bodyPr/>
+                    <a:lstStyle/>
+                    <a:p>
+                      <a:pPr algn="l" fontAlgn="b"/>
+                      <a:r>
+                        <a:rPr lang="en-US" sz="1100" u="none" strike="noStrike">
+                          <a:effectLst/>
+                        </a:rPr>
+                        <a:t>Methodology</a:t>
+                      </a:r>
+                      <a:endParaRPr lang="en-US" sz="1100" b="0" i="0" u="none" strike="noStrike">
+                        <a:solidFill>
+                          <a:srgbClr val="000000"/>
+                        </a:solidFill>
+                        <a:effectLst/>
+                        <a:latin typeface="Calibri" panose="020F0502020204030204" pitchFamily="34" charset="0"/>
+                      </a:endParaRPr>
+                    </a:p>
+                  </a:txBody>
+                  <a:tcPr marL="9525" marR="9525" marT="9525" marB="0" anchor="b"/>
+                </a:tc>
+                <a:tc>
+                  <a:txBody>
+                    <a:bodyPr/>
+                    <a:lstStyle/>
+                    <a:p>
+                      <a:pPr algn="ctr" fontAlgn="ctr"/>
+                      <a:r>
+                        <a:rPr lang="en-US" sz="1100" u="none" strike="noStrike">
+                          <a:effectLst/>
+                        </a:rPr>
+                        <a:t>60%</a:t>
+                      </a:r>
+                      <a:endParaRPr lang="en-US" sz="1100" b="0" i="0" u="none" strike="noStrike">
+                        <a:solidFill>
+                          <a:srgbClr val="000000"/>
+                        </a:solidFill>
+                        <a:effectLst/>
+                        <a:latin typeface="Calibri" panose="020F0502020204030204" pitchFamily="34" charset="0"/>
+                      </a:endParaRPr>
+                    </a:p>
+                  </a:txBody>
+                  <a:tcPr marL="9525" marR="9525" marT="9525" marB="0" anchor="ctr"/>
+                </a:tc>
+                <a:extLst>
+                  <a:ext uri="{0D108BD9-81ED-4DB2-BD59-A6C34878D82A}">
+                    <a16:rowId xmlns:a16="http://schemas.microsoft.com/office/drawing/2014/main" val="3461216669"/>
+                  </a:ext>
+                </a:extLst>
+              </a:tr>
+              <a:tr h="190500">
+                <a:tc>
+                  <a:txBody>
+                    <a:bodyPr/>
+                    <a:lstStyle/>
+                    <a:p>
+                      <a:pPr algn="l" fontAlgn="b"/>
+                      <a:r>
+                        <a:rPr lang="en-US" sz="1100" u="none" strike="noStrike">
+                          <a:effectLst/>
+                        </a:rPr>
+                        <a:t>Results</a:t>
+                      </a:r>
+                      <a:endParaRPr lang="en-US" sz="1100" b="0" i="0" u="none" strike="noStrike">
+                        <a:solidFill>
+                          <a:srgbClr val="000000"/>
+                        </a:solidFill>
+                        <a:effectLst/>
+                        <a:latin typeface="Calibri" panose="020F0502020204030204" pitchFamily="34" charset="0"/>
+                      </a:endParaRPr>
+                    </a:p>
+                  </a:txBody>
+                  <a:tcPr marL="9525" marR="9525" marT="9525" marB="0" anchor="b"/>
+                </a:tc>
+                <a:tc>
+                  <a:txBody>
+                    <a:bodyPr/>
+                    <a:lstStyle/>
+                    <a:p>
+                      <a:pPr algn="ctr" fontAlgn="ctr"/>
+                      <a:r>
+                        <a:rPr lang="en-US" sz="1100" u="none" strike="noStrike">
+                          <a:effectLst/>
+                        </a:rPr>
+                        <a:t>40%</a:t>
+                      </a:r>
+                      <a:endParaRPr lang="en-US" sz="1100" b="0" i="0" u="none" strike="noStrike">
+                        <a:solidFill>
+                          <a:srgbClr val="000000"/>
+                        </a:solidFill>
+                        <a:effectLst/>
+                        <a:latin typeface="Calibri" panose="020F0502020204030204" pitchFamily="34" charset="0"/>
+                      </a:endParaRPr>
+                    </a:p>
+                  </a:txBody>
+                  <a:tcPr marL="9525" marR="9525" marT="9525" marB="0" anchor="ctr"/>
+                </a:tc>
+                <a:extLst>
+                  <a:ext uri="{0D108BD9-81ED-4DB2-BD59-A6C34878D82A}">
+                    <a16:rowId xmlns:a16="http://schemas.microsoft.com/office/drawing/2014/main" val="1841393162"/>
+                  </a:ext>
+                </a:extLst>
+              </a:tr>
+              <a:tr h="190500">
+                <a:tc>
+                  <a:txBody>
+                    <a:bodyPr/>
+                    <a:lstStyle/>
+                    <a:p>
+                      <a:pPr algn="l" fontAlgn="b"/>
+                      <a:r>
+                        <a:rPr lang="en-US" sz="1100" u="none" strike="noStrike">
+                          <a:effectLst/>
+                        </a:rPr>
+                        <a:t>Conclusions</a:t>
+                      </a:r>
+                      <a:endParaRPr lang="en-US" sz="1100" b="0" i="0" u="none" strike="noStrike">
+                        <a:solidFill>
+                          <a:srgbClr val="000000"/>
+                        </a:solidFill>
+                        <a:effectLst/>
+                        <a:latin typeface="Calibri" panose="020F0502020204030204" pitchFamily="34" charset="0"/>
+                      </a:endParaRPr>
+                    </a:p>
+                  </a:txBody>
+                  <a:tcPr marL="9525" marR="9525" marT="9525" marB="0" anchor="b"/>
+                </a:tc>
+                <a:tc>
+                  <a:txBody>
+                    <a:bodyPr/>
+                    <a:lstStyle/>
+                    <a:p>
+                      <a:pPr algn="ctr" fontAlgn="ctr"/>
+                      <a:r>
+                        <a:rPr lang="en-US" sz="1100" u="none" strike="noStrike">
+                          <a:effectLst/>
+                        </a:rPr>
+                        <a:t>50%</a:t>
+                      </a:r>
+                      <a:endParaRPr lang="en-US" sz="1100" b="0" i="0" u="none" strike="noStrike">
+                        <a:solidFill>
+                          <a:srgbClr val="000000"/>
+                        </a:solidFill>
+                        <a:effectLst/>
+                        <a:latin typeface="Calibri" panose="020F0502020204030204" pitchFamily="34" charset="0"/>
+                      </a:endParaRPr>
+                    </a:p>
+                  </a:txBody>
+                  <a:tcPr marL="9525" marR="9525" marT="9525" marB="0" anchor="ctr"/>
+                </a:tc>
+                <a:extLst>
+                  <a:ext uri="{0D108BD9-81ED-4DB2-BD59-A6C34878D82A}">
+                    <a16:rowId xmlns:a16="http://schemas.microsoft.com/office/drawing/2014/main" val="1947622781"/>
+                  </a:ext>
+                </a:extLst>
+              </a:tr>
+              <a:tr h="190500">
+                <a:tc>
+                  <a:txBody>
+                    <a:bodyPr/>
+                    <a:lstStyle/>
+                    <a:p>
+                      <a:pPr algn="l" fontAlgn="b"/>
+                      <a:r>
+                        <a:rPr lang="en-US" sz="1100" u="none" strike="noStrike">
+                          <a:effectLst/>
+                        </a:rPr>
+                        <a:t>Discussion</a:t>
+                      </a:r>
+                      <a:endParaRPr lang="en-US" sz="1100" b="0" i="0" u="none" strike="noStrike">
+                        <a:solidFill>
+                          <a:srgbClr val="000000"/>
+                        </a:solidFill>
+                        <a:effectLst/>
+                        <a:latin typeface="Calibri" panose="020F0502020204030204" pitchFamily="34" charset="0"/>
+                      </a:endParaRPr>
+                    </a:p>
+                  </a:txBody>
+                  <a:tcPr marL="9525" marR="9525" marT="9525" marB="0" anchor="b"/>
+                </a:tc>
+                <a:tc>
+                  <a:txBody>
+                    <a:bodyPr/>
+                    <a:lstStyle/>
+                    <a:p>
+                      <a:pPr algn="ctr" fontAlgn="ctr"/>
+                      <a:r>
+                        <a:rPr lang="en-US" sz="1100" u="none" strike="noStrike" dirty="0">
+                          <a:effectLst/>
+                        </a:rPr>
+                        <a:t>30%</a:t>
+                      </a:r>
+                      <a:endParaRPr lang="en-US" sz="1100" b="0" i="0" u="none" strike="noStrike" dirty="0">
+                        <a:solidFill>
+                          <a:srgbClr val="000000"/>
+                        </a:solidFill>
+                        <a:effectLst/>
+                        <a:latin typeface="Calibri" panose="020F0502020204030204" pitchFamily="34" charset="0"/>
+                      </a:endParaRPr>
+                    </a:p>
+                  </a:txBody>
+                  <a:tcPr marL="9525" marR="9525" marT="9525" marB="0" anchor="ctr"/>
+                </a:tc>
+                <a:extLst>
+                  <a:ext uri="{0D108BD9-81ED-4DB2-BD59-A6C34878D82A}">
+                    <a16:rowId xmlns:a16="http://schemas.microsoft.com/office/drawing/2014/main" val="3770902340"/>
+                  </a:ext>
+                </a:extLst>
+              </a:tr>
+            </a:tbl>
+          </a:graphicData>
+        </a:graphic>
+      </p:graphicFrame>
+      <p:sp>
+        <p:nvSpPr>
+          <p:cNvPr id="14" name="TextBox 13">
+            <a:extLst>
+              <a:ext uri="{FF2B5EF4-FFF2-40B4-BE49-F238E27FC236}">
+                <a16:creationId xmlns:a16="http://schemas.microsoft.com/office/drawing/2014/main" id="{24229FE0-7152-A79B-B9AA-15556DDB8FCC}"/>
+              </a:ext>
+            </a:extLst>
+          </p:cNvPr>
+          <p:cNvSpPr txBox="1"/>
+          <p:nvPr/>
+        </p:nvSpPr>
+        <p:spPr>
+          <a:xfrm>
+            <a:off x="3322440" y="3429000"/>
+            <a:ext cx="6876070" cy="307777"/>
+          </a:xfrm>
+          <a:prstGeom prst="rect">
+            <a:avLst/>
+          </a:prstGeom>
+          <a:noFill/>
+        </p:spPr>
+        <p:txBody>
+          <a:bodyPr wrap="square">
+            <a:spAutoFit/>
+          </a:bodyPr>
+          <a:lstStyle/>
+          <a:p>
+            <a:pPr marL="285750" indent="-285750" algn="just" rtl="0">
+              <a:buFont typeface="Wingdings" panose="05000000000000000000" pitchFamily="2" charset="2"/>
+              <a:buChar char="v"/>
+            </a:pPr>
+            <a:r>
+              <a:rPr lang="en-US" sz="1400" dirty="0"/>
+              <a:t>Percentage shows with what probability the sentence was selected from particular part.</a:t>
+            </a:r>
+          </a:p>
+        </p:txBody>
+      </p:sp>
     </p:spTree>
     <p:extLst>
       <p:ext uri="{BB962C8B-B14F-4D97-AF65-F5344CB8AC3E}">
-        <p14:creationId xmlns:p14="http://schemas.microsoft.com/office/powerpoint/2010/main" val="197228145"/>
+        <p14:creationId xmlns:p14="http://schemas.microsoft.com/office/powerpoint/2010/main" val="1220705470"/>
       </p:ext>
     </p:extLst>
   </p:cSld>
   <p:clrMapOvr>
     <a:masterClrMapping/>
   </p:clrMapOvr>
-  <mc:AlternateContent xmlns:mc="http://schemas.openxmlformats.org/markup-compatibility/2006" xmlns:p14="http://schemas.microsoft.com/office/powerpoint/2010/main">
-    <mc:Choice Requires="p14">
-      <p:transition p14:dur="0"/>
-    </mc:Choice>
-    <mc:Fallback xmlns="">
-      <p:transition/>
-    </mc:Fallback>
-  </mc:AlternateContent>
-  <p:timing>
-    <p:tnLst>
-      <p:par>
-        <p:cTn id="1" dur="indefinite" restart="never" nodeType="tmRoot"/>
-      </p:par>
-    </p:tnLst>
-  </p:timing>
 </p:sld>
 </file>
 
-<file path=ppt/slides/slide13.xml><?xml version="1.0" encoding="utf-8"?>
+<file path=ppt/slides/slide15.xml><?xml version="1.0" encoding="utf-8"?>
 <p:sld xmlns:a="http://schemas.openxmlformats.org/drawingml/2006/main" xmlns:r="http://schemas.openxmlformats.org/officeDocument/2006/relationships" xmlns:p="http://schemas.openxmlformats.org/presentationml/2006/main">
   <p:cSld>
     <p:spTree>
@@ -13985,21 +15440,6 @@
   <p:clrMapOvr>
     <a:masterClrMapping/>
   </p:clrMapOvr>
-  <mc:AlternateContent xmlns:mc="http://schemas.openxmlformats.org/markup-compatibility/2006" xmlns:p14="http://schemas.microsoft.com/office/powerpoint/2010/main">
-    <mc:Choice Requires="p14">
-      <p:transition p14:dur="0"/>
-    </mc:Choice>
-    <mc:Fallback xmlns="">
-      <p:transition/>
-    </mc:Fallback>
-  </mc:AlternateContent>
-  <p:timing>
-    <p:tnLst>
-      <p:par>
-        <p:cTn id="1" dur="indefinite" restart="never" nodeType="tmRoot"/>
-      </p:par>
-    </p:tnLst>
-  </p:timing>
 </p:sld>
 </file>
 
@@ -46207,18 +47647,305 @@
   <p:clrMapOvr>
     <a:masterClrMapping/>
   </p:clrMapOvr>
-  <mc:AlternateContent xmlns:mc="http://schemas.openxmlformats.org/markup-compatibility/2006" xmlns:p14="http://schemas.microsoft.com/office/powerpoint/2010/main">
-    <mc:Choice Requires="p14">
-      <p:transition p14:dur="0"/>
-    </mc:Choice>
-    <mc:Fallback xmlns="">
-      <p:transition/>
-    </mc:Fallback>
-  </mc:AlternateContent>
 </p:sld>
 </file>
 
 <file path=ppt/slides/slide3.xml><?xml version="1.0" encoding="utf-8"?>
+<p:sld xmlns:a="http://schemas.openxmlformats.org/drawingml/2006/main" xmlns:r="http://schemas.openxmlformats.org/officeDocument/2006/relationships" xmlns:p="http://schemas.openxmlformats.org/presentationml/2006/main">
+  <p:cSld>
+    <p:spTree>
+      <p:nvGrpSpPr>
+        <p:cNvPr id="1" name=""/>
+        <p:cNvGrpSpPr/>
+        <p:nvPr/>
+      </p:nvGrpSpPr>
+      <p:grpSpPr>
+        <a:xfrm>
+          <a:off x="0" y="0"/>
+          <a:ext cx="0" cy="0"/>
+          <a:chOff x="0" y="0"/>
+          <a:chExt cx="0" cy="0"/>
+        </a:xfrm>
+      </p:grpSpPr>
+      <p:sp>
+        <p:nvSpPr>
+          <p:cNvPr id="2" name="Rectangle 1"/>
+          <p:cNvSpPr/>
+          <p:nvPr/>
+        </p:nvSpPr>
+        <p:spPr>
+          <a:xfrm>
+            <a:off x="690584" y="213458"/>
+            <a:ext cx="10349501" cy="769441"/>
+          </a:xfrm>
+          <a:prstGeom prst="rect">
+            <a:avLst/>
+          </a:prstGeom>
+        </p:spPr>
+        <p:txBody>
+          <a:bodyPr wrap="none">
+            <a:spAutoFit/>
+          </a:bodyPr>
+          <a:lstStyle/>
+          <a:p>
+            <a:r>
+              <a:rPr lang="en-US" sz="4400" b="1" dirty="0">
+                <a:solidFill>
+                  <a:schemeClr val="accent6"/>
+                </a:solidFill>
+              </a:rPr>
+              <a:t>Abstract Generator - Online Abstract Maker</a:t>
+            </a:r>
+            <a:endParaRPr lang="en-US" sz="4400" dirty="0">
+              <a:solidFill>
+                <a:schemeClr val="accent6"/>
+              </a:solidFill>
+              <a:effectLst/>
+            </a:endParaRPr>
+          </a:p>
+        </p:txBody>
+      </p:sp>
+      <p:sp>
+        <p:nvSpPr>
+          <p:cNvPr id="3" name="Rectangle 2"/>
+          <p:cNvSpPr/>
+          <p:nvPr/>
+        </p:nvSpPr>
+        <p:spPr>
+          <a:xfrm>
+            <a:off x="690584" y="1189732"/>
+            <a:ext cx="11140611" cy="2457083"/>
+          </a:xfrm>
+          <a:prstGeom prst="rect">
+            <a:avLst/>
+          </a:prstGeom>
+        </p:spPr>
+        <p:txBody>
+          <a:bodyPr wrap="square">
+            <a:spAutoFit/>
+          </a:bodyPr>
+          <a:lstStyle/>
+          <a:p>
+            <a:pPr marL="342900" lvl="0" indent="-342900" algn="l" rtl="0">
+              <a:lnSpc>
+                <a:spcPct val="150000"/>
+              </a:lnSpc>
+              <a:spcAft>
+                <a:spcPts val="0"/>
+              </a:spcAft>
+              <a:buFont typeface="+mj-lt"/>
+              <a:buAutoNum type="arabicPeriod"/>
+            </a:pPr>
+            <a:r>
+              <a:rPr lang="en-US" sz="1400" u="sng" dirty="0">
+                <a:latin typeface="Times New Roman" panose="02020603050405020304" pitchFamily="18" charset="0"/>
+                <a:ea typeface="Calibri" panose="020F0502020204030204" pitchFamily="34" charset="0"/>
+                <a:cs typeface="Times New Roman" panose="02020603050405020304" pitchFamily="18" charset="0"/>
+                <a:hlinkClick r:id="rId2"/>
+              </a:rPr>
+              <a:t>https://www.editpad.org/tool/abstract-generator</a:t>
+            </a:r>
+            <a:endParaRPr lang="en-US" sz="1400" dirty="0">
+              <a:latin typeface="Times New Roman" panose="02020603050405020304" pitchFamily="18" charset="0"/>
+              <a:ea typeface="Calibri" panose="020F0502020204030204" pitchFamily="34" charset="0"/>
+              <a:cs typeface="Times New Roman" panose="02020603050405020304" pitchFamily="18" charset="0"/>
+            </a:endParaRPr>
+          </a:p>
+          <a:p>
+            <a:pPr marL="342900" lvl="0" indent="-342900" algn="l" rtl="0">
+              <a:lnSpc>
+                <a:spcPct val="150000"/>
+              </a:lnSpc>
+              <a:spcAft>
+                <a:spcPts val="0"/>
+              </a:spcAft>
+              <a:buFont typeface="+mj-lt"/>
+              <a:buAutoNum type="arabicPeriod"/>
+            </a:pPr>
+            <a:r>
+              <a:rPr lang="en-US" sz="1400" u="sng" dirty="0">
+                <a:latin typeface="Times New Roman" panose="02020603050405020304" pitchFamily="18" charset="0"/>
+                <a:ea typeface="Calibri" panose="020F0502020204030204" pitchFamily="34" charset="0"/>
+                <a:cs typeface="Times New Roman" panose="02020603050405020304" pitchFamily="18" charset="0"/>
+                <a:hlinkClick r:id="rId3"/>
+              </a:rPr>
+              <a:t>https://quillbot.com/summarize?utm_medium=paid_search&amp;utm_source=google&amp;utm_campaign=summarize_premium&amp;campaign_type=search</a:t>
+            </a:r>
+            <a:endParaRPr lang="en-US" sz="1400" dirty="0">
+              <a:latin typeface="Times New Roman" panose="02020603050405020304" pitchFamily="18" charset="0"/>
+              <a:ea typeface="Calibri" panose="020F0502020204030204" pitchFamily="34" charset="0"/>
+              <a:cs typeface="Times New Roman" panose="02020603050405020304" pitchFamily="18" charset="0"/>
+            </a:endParaRPr>
+          </a:p>
+          <a:p>
+            <a:pPr marL="342900" lvl="0" indent="-342900" algn="l" rtl="0">
+              <a:lnSpc>
+                <a:spcPct val="150000"/>
+              </a:lnSpc>
+              <a:spcAft>
+                <a:spcPts val="0"/>
+              </a:spcAft>
+              <a:buFont typeface="+mj-lt"/>
+              <a:buAutoNum type="arabicPeriod"/>
+            </a:pPr>
+            <a:r>
+              <a:rPr lang="en-US" sz="1400" u="sng" dirty="0">
+                <a:latin typeface="Times New Roman" panose="02020603050405020304" pitchFamily="18" charset="0"/>
+                <a:ea typeface="Calibri" panose="020F0502020204030204" pitchFamily="34" charset="0"/>
+                <a:cs typeface="Times New Roman" panose="02020603050405020304" pitchFamily="18" charset="0"/>
+                <a:hlinkClick r:id="rId4"/>
+              </a:rPr>
+              <a:t>https://www.phdresearchproposal.org/abstract-generator/</a:t>
+            </a:r>
+            <a:endParaRPr lang="en-US" sz="1400" dirty="0">
+              <a:latin typeface="Times New Roman" panose="02020603050405020304" pitchFamily="18" charset="0"/>
+              <a:ea typeface="Calibri" panose="020F0502020204030204" pitchFamily="34" charset="0"/>
+              <a:cs typeface="Times New Roman" panose="02020603050405020304" pitchFamily="18" charset="0"/>
+            </a:endParaRPr>
+          </a:p>
+          <a:p>
+            <a:pPr marL="342900" lvl="0" indent="-342900" algn="l" rtl="0">
+              <a:lnSpc>
+                <a:spcPct val="150000"/>
+              </a:lnSpc>
+              <a:spcAft>
+                <a:spcPts val="0"/>
+              </a:spcAft>
+              <a:buFont typeface="+mj-lt"/>
+              <a:buAutoNum type="arabicPeriod"/>
+            </a:pPr>
+            <a:r>
+              <a:rPr lang="en-US" sz="1400" u="sng" dirty="0">
+                <a:latin typeface="Times New Roman" panose="02020603050405020304" pitchFamily="18" charset="0"/>
+                <a:ea typeface="Calibri" panose="020F0502020204030204" pitchFamily="34" charset="0"/>
+                <a:cs typeface="Times New Roman" panose="02020603050405020304" pitchFamily="18" charset="0"/>
+                <a:hlinkClick r:id="rId5"/>
+              </a:rPr>
+              <a:t>https://www.classgist.com/abstract-generator.aspx</a:t>
+            </a:r>
+            <a:endParaRPr lang="en-US" sz="1400" dirty="0">
+              <a:latin typeface="Times New Roman" panose="02020603050405020304" pitchFamily="18" charset="0"/>
+              <a:ea typeface="Calibri" panose="020F0502020204030204" pitchFamily="34" charset="0"/>
+              <a:cs typeface="Times New Roman" panose="02020603050405020304" pitchFamily="18" charset="0"/>
+            </a:endParaRPr>
+          </a:p>
+          <a:p>
+            <a:pPr marL="342900" lvl="0" indent="-342900" algn="l" rtl="0">
+              <a:lnSpc>
+                <a:spcPct val="150000"/>
+              </a:lnSpc>
+              <a:spcAft>
+                <a:spcPts val="0"/>
+              </a:spcAft>
+              <a:buFont typeface="+mj-lt"/>
+              <a:buAutoNum type="arabicPeriod"/>
+            </a:pPr>
+            <a:r>
+              <a:rPr lang="en-US" sz="1400" u="sng" dirty="0">
+                <a:latin typeface="Times New Roman" panose="02020603050405020304" pitchFamily="18" charset="0"/>
+                <a:ea typeface="Calibri" panose="020F0502020204030204" pitchFamily="34" charset="0"/>
+                <a:cs typeface="Times New Roman" panose="02020603050405020304" pitchFamily="18" charset="0"/>
+                <a:hlinkClick r:id="rId6"/>
+              </a:rPr>
+              <a:t>https://www.scholarcy.com/what-makes-a-good-abstract/</a:t>
+            </a:r>
+            <a:endParaRPr lang="en-US" sz="1400" dirty="0">
+              <a:latin typeface="Times New Roman" panose="02020603050405020304" pitchFamily="18" charset="0"/>
+              <a:ea typeface="Calibri" panose="020F0502020204030204" pitchFamily="34" charset="0"/>
+              <a:cs typeface="Times New Roman" panose="02020603050405020304" pitchFamily="18" charset="0"/>
+            </a:endParaRPr>
+          </a:p>
+          <a:p>
+            <a:pPr marL="342900" lvl="0" indent="-342900" algn="l" rtl="0">
+              <a:lnSpc>
+                <a:spcPct val="150000"/>
+              </a:lnSpc>
+              <a:spcAft>
+                <a:spcPts val="800"/>
+              </a:spcAft>
+              <a:buFont typeface="+mj-lt"/>
+              <a:buAutoNum type="arabicPeriod"/>
+            </a:pPr>
+            <a:r>
+              <a:rPr lang="en-US" sz="1400" u="sng" dirty="0">
+                <a:latin typeface="Times New Roman" panose="02020603050405020304" pitchFamily="18" charset="0"/>
+                <a:ea typeface="Calibri" panose="020F0502020204030204" pitchFamily="34" charset="0"/>
+                <a:cs typeface="Times New Roman" panose="02020603050405020304" pitchFamily="18" charset="0"/>
+                <a:hlinkClick r:id="rId7"/>
+              </a:rPr>
+              <a:t>https://assignzen.com/free-writing-tools/abstract-generator/</a:t>
+            </a:r>
+            <a:endParaRPr lang="en-US" sz="1400" u="sng" dirty="0">
+              <a:latin typeface="Times New Roman" panose="02020603050405020304" pitchFamily="18" charset="0"/>
+              <a:ea typeface="Calibri" panose="020F0502020204030204" pitchFamily="34" charset="0"/>
+              <a:cs typeface="Times New Roman" panose="02020603050405020304" pitchFamily="18" charset="0"/>
+            </a:endParaRPr>
+          </a:p>
+          <a:p>
+            <a:pPr marL="342900" lvl="0" indent="-342900" algn="l" rtl="0">
+              <a:lnSpc>
+                <a:spcPct val="150000"/>
+              </a:lnSpc>
+              <a:spcAft>
+                <a:spcPts val="800"/>
+              </a:spcAft>
+              <a:buFont typeface="+mj-lt"/>
+              <a:buAutoNum type="arabicPeriod"/>
+            </a:pPr>
+            <a:r>
+              <a:rPr lang="en-US" sz="1400" u="sng" dirty="0">
+                <a:latin typeface="Times New Roman" panose="02020603050405020304" pitchFamily="18" charset="0"/>
+                <a:ea typeface="Calibri" panose="020F0502020204030204" pitchFamily="34" charset="0"/>
+                <a:cs typeface="Times New Roman" panose="02020603050405020304" pitchFamily="18" charset="0"/>
+                <a:hlinkClick r:id="rId8"/>
+              </a:rPr>
+              <a:t>https://www.nelsenso.net/en/abstract-online.aspx</a:t>
+            </a:r>
+            <a:endParaRPr lang="en-US" sz="1400" dirty="0">
+              <a:latin typeface="Times New Roman" panose="02020603050405020304" pitchFamily="18" charset="0"/>
+              <a:cs typeface="Times New Roman" panose="02020603050405020304" pitchFamily="18" charset="0"/>
+            </a:endParaRPr>
+          </a:p>
+        </p:txBody>
+      </p:sp>
+      <p:pic>
+        <p:nvPicPr>
+          <p:cNvPr id="4" name="Picture 3"/>
+          <p:cNvPicPr>
+            <a:picLocks noChangeAspect="1"/>
+          </p:cNvPicPr>
+          <p:nvPr/>
+        </p:nvPicPr>
+        <p:blipFill>
+          <a:blip r:embed="rId9"/>
+          <a:stretch>
+            <a:fillRect/>
+          </a:stretch>
+        </p:blipFill>
+        <p:spPr>
+          <a:xfrm>
+            <a:off x="7809844" y="2510947"/>
+            <a:ext cx="2051221" cy="2051221"/>
+          </a:xfrm>
+          <a:prstGeom prst="rect">
+            <a:avLst/>
+          </a:prstGeom>
+        </p:spPr>
+      </p:pic>
+    </p:spTree>
+    <p:extLst>
+      <p:ext uri="{BB962C8B-B14F-4D97-AF65-F5344CB8AC3E}">
+        <p14:creationId xmlns:p14="http://schemas.microsoft.com/office/powerpoint/2010/main" val="2595252127"/>
+      </p:ext>
+    </p:extLst>
+  </p:cSld>
+  <p:clrMapOvr>
+    <a:masterClrMapping/>
+  </p:clrMapOvr>
+</p:sld>
+</file>
+
+<file path=ppt/slides/slide4.xml><?xml version="1.0" encoding="utf-8"?>
 <p:sld xmlns:a="http://schemas.openxmlformats.org/drawingml/2006/main" xmlns:r="http://schemas.openxmlformats.org/officeDocument/2006/relationships" xmlns:p="http://schemas.openxmlformats.org/presentationml/2006/main">
   <p:cSld>
     <p:spTree>
@@ -46591,17 +48318,10 @@
   <p:clrMapOvr>
     <a:masterClrMapping/>
   </p:clrMapOvr>
-  <p:timing>
-    <p:tnLst>
-      <p:par>
-        <p:cTn id="1" dur="indefinite" restart="never" nodeType="tmRoot"/>
-      </p:par>
-    </p:tnLst>
-  </p:timing>
 </p:sld>
 </file>
 
-<file path=ppt/slides/slide4.xml><?xml version="1.0" encoding="utf-8"?>
+<file path=ppt/slides/slide5.xml><?xml version="1.0" encoding="utf-8"?>
 <p:sld xmlns:a="http://schemas.openxmlformats.org/drawingml/2006/main" xmlns:r="http://schemas.openxmlformats.org/officeDocument/2006/relationships" xmlns:p="http://schemas.openxmlformats.org/presentationml/2006/main">
   <p:cSld>
     <p:spTree>
@@ -46905,352 +48625,6 @@
   <p:clrMapOvr>
     <a:masterClrMapping/>
   </p:clrMapOvr>
-  <mc:AlternateContent xmlns:mc="http://schemas.openxmlformats.org/markup-compatibility/2006" xmlns:p14="http://schemas.microsoft.com/office/powerpoint/2010/main">
-    <mc:Choice Requires="p14">
-      <p:transition p14:dur="0"/>
-    </mc:Choice>
-    <mc:Fallback xmlns="">
-      <p:transition/>
-    </mc:Fallback>
-  </mc:AlternateContent>
-  <p:timing>
-    <p:tnLst>
-      <p:par>
-        <p:cTn id="1" dur="indefinite" restart="never" nodeType="tmRoot"/>
-      </p:par>
-    </p:tnLst>
-  </p:timing>
-</p:sld>
-</file>
-
-<file path=ppt/slides/slide5.xml><?xml version="1.0" encoding="utf-8"?>
-<p:sld xmlns:a="http://schemas.openxmlformats.org/drawingml/2006/main" xmlns:r="http://schemas.openxmlformats.org/officeDocument/2006/relationships" xmlns:p="http://schemas.openxmlformats.org/presentationml/2006/main">
-  <p:cSld>
-    <p:spTree>
-      <p:nvGrpSpPr>
-        <p:cNvPr id="1" name=""/>
-        <p:cNvGrpSpPr/>
-        <p:nvPr/>
-      </p:nvGrpSpPr>
-      <p:grpSpPr>
-        <a:xfrm>
-          <a:off x="0" y="0"/>
-          <a:ext cx="0" cy="0"/>
-          <a:chOff x="0" y="0"/>
-          <a:chExt cx="0" cy="0"/>
-        </a:xfrm>
-      </p:grpSpPr>
-      <p:sp>
-        <p:nvSpPr>
-          <p:cNvPr id="2" name="Rectangle 1"/>
-          <p:cNvSpPr/>
-          <p:nvPr/>
-        </p:nvSpPr>
-        <p:spPr>
-          <a:xfrm>
-            <a:off x="690584" y="213458"/>
-            <a:ext cx="10349501" cy="769441"/>
-          </a:xfrm>
-          <a:prstGeom prst="rect">
-            <a:avLst/>
-          </a:prstGeom>
-        </p:spPr>
-        <p:txBody>
-          <a:bodyPr wrap="none">
-            <a:spAutoFit/>
-          </a:bodyPr>
-          <a:lstStyle/>
-          <a:p>
-            <a:r>
-              <a:rPr lang="en-US" sz="4400" b="1" dirty="0">
-                <a:solidFill>
-                  <a:schemeClr val="accent6"/>
-                </a:solidFill>
-              </a:rPr>
-              <a:t>Abstract Generator - Online Abstract Maker</a:t>
-            </a:r>
-            <a:endParaRPr lang="en-US" sz="4400" dirty="0">
-              <a:solidFill>
-                <a:schemeClr val="accent6"/>
-              </a:solidFill>
-              <a:effectLst/>
-            </a:endParaRPr>
-          </a:p>
-        </p:txBody>
-      </p:sp>
-      <p:sp>
-        <p:nvSpPr>
-          <p:cNvPr id="3" name="Rectangle 2"/>
-          <p:cNvSpPr/>
-          <p:nvPr/>
-        </p:nvSpPr>
-        <p:spPr>
-          <a:xfrm>
-            <a:off x="1157555" y="1384941"/>
-            <a:ext cx="6548063" cy="2780248"/>
-          </a:xfrm>
-          <a:prstGeom prst="rect">
-            <a:avLst/>
-          </a:prstGeom>
-        </p:spPr>
-        <p:txBody>
-          <a:bodyPr wrap="square">
-            <a:spAutoFit/>
-          </a:bodyPr>
-          <a:lstStyle/>
-          <a:p>
-            <a:pPr marL="342900" lvl="0" indent="-342900" algn="l" rtl="0">
-              <a:lnSpc>
-                <a:spcPct val="150000"/>
-              </a:lnSpc>
-              <a:spcAft>
-                <a:spcPts val="0"/>
-              </a:spcAft>
-              <a:buFont typeface="+mj-lt"/>
-              <a:buAutoNum type="arabicPeriod"/>
-            </a:pPr>
-            <a:r>
-              <a:rPr lang="en-US" sz="1400" u="sng" dirty="0">
-                <a:solidFill>
-                  <a:srgbClr val="0000FF"/>
-                </a:solidFill>
-                <a:latin typeface="Times New Roman" panose="02020603050405020304" pitchFamily="18" charset="0"/>
-                <a:ea typeface="Calibri" panose="020F0502020204030204" pitchFamily="34" charset="0"/>
-                <a:cs typeface="Times New Roman" panose="02020603050405020304" pitchFamily="18" charset="0"/>
-                <a:hlinkClick r:id="rId2"/>
-              </a:rPr>
-              <a:t>https://www.editpad.org/tool/abstract-generator</a:t>
-            </a:r>
-            <a:endParaRPr lang="en-US" sz="1400" dirty="0">
-              <a:latin typeface="Times New Roman" panose="02020603050405020304" pitchFamily="18" charset="0"/>
-              <a:ea typeface="Calibri" panose="020F0502020204030204" pitchFamily="34" charset="0"/>
-              <a:cs typeface="Times New Roman" panose="02020603050405020304" pitchFamily="18" charset="0"/>
-            </a:endParaRPr>
-          </a:p>
-          <a:p>
-            <a:pPr marL="342900" lvl="0" indent="-342900" algn="l" rtl="0">
-              <a:lnSpc>
-                <a:spcPct val="150000"/>
-              </a:lnSpc>
-              <a:spcAft>
-                <a:spcPts val="0"/>
-              </a:spcAft>
-              <a:buFont typeface="+mj-lt"/>
-              <a:buAutoNum type="arabicPeriod"/>
-            </a:pPr>
-            <a:r>
-              <a:rPr lang="en-US" sz="1400" u="sng" dirty="0">
-                <a:solidFill>
-                  <a:srgbClr val="0000FF"/>
-                </a:solidFill>
-                <a:latin typeface="Times New Roman" panose="02020603050405020304" pitchFamily="18" charset="0"/>
-                <a:ea typeface="Calibri" panose="020F0502020204030204" pitchFamily="34" charset="0"/>
-                <a:cs typeface="Times New Roman" panose="02020603050405020304" pitchFamily="18" charset="0"/>
-                <a:hlinkClick r:id="rId3"/>
-              </a:rPr>
-              <a:t>https://quillbot.com/summarize?utm_medium=paid_search&amp;utm_source=google&amp;utm_campaign=summarize_premium&amp;campaign_type=search</a:t>
-            </a:r>
-            <a:endParaRPr lang="en-US" sz="1400" dirty="0">
-              <a:latin typeface="Times New Roman" panose="02020603050405020304" pitchFamily="18" charset="0"/>
-              <a:ea typeface="Calibri" panose="020F0502020204030204" pitchFamily="34" charset="0"/>
-              <a:cs typeface="Times New Roman" panose="02020603050405020304" pitchFamily="18" charset="0"/>
-            </a:endParaRPr>
-          </a:p>
-          <a:p>
-            <a:pPr marL="342900" lvl="0" indent="-342900" algn="l" rtl="0">
-              <a:lnSpc>
-                <a:spcPct val="150000"/>
-              </a:lnSpc>
-              <a:spcAft>
-                <a:spcPts val="0"/>
-              </a:spcAft>
-              <a:buFont typeface="+mj-lt"/>
-              <a:buAutoNum type="arabicPeriod"/>
-            </a:pPr>
-            <a:r>
-              <a:rPr lang="en-US" sz="1400" u="sng" dirty="0">
-                <a:solidFill>
-                  <a:srgbClr val="0000FF"/>
-                </a:solidFill>
-                <a:latin typeface="Times New Roman" panose="02020603050405020304" pitchFamily="18" charset="0"/>
-                <a:ea typeface="Calibri" panose="020F0502020204030204" pitchFamily="34" charset="0"/>
-                <a:cs typeface="Times New Roman" panose="02020603050405020304" pitchFamily="18" charset="0"/>
-                <a:hlinkClick r:id="rId4"/>
-              </a:rPr>
-              <a:t>https://www.phdresearchproposal.org/abstract-generator/</a:t>
-            </a:r>
-            <a:endParaRPr lang="en-US" sz="1400" dirty="0">
-              <a:latin typeface="Times New Roman" panose="02020603050405020304" pitchFamily="18" charset="0"/>
-              <a:ea typeface="Calibri" panose="020F0502020204030204" pitchFamily="34" charset="0"/>
-              <a:cs typeface="Times New Roman" panose="02020603050405020304" pitchFamily="18" charset="0"/>
-            </a:endParaRPr>
-          </a:p>
-          <a:p>
-            <a:pPr marL="342900" lvl="0" indent="-342900" algn="l" rtl="0">
-              <a:lnSpc>
-                <a:spcPct val="150000"/>
-              </a:lnSpc>
-              <a:spcAft>
-                <a:spcPts val="0"/>
-              </a:spcAft>
-              <a:buFont typeface="+mj-lt"/>
-              <a:buAutoNum type="arabicPeriod"/>
-            </a:pPr>
-            <a:r>
-              <a:rPr lang="en-US" sz="1400" u="sng" dirty="0">
-                <a:solidFill>
-                  <a:srgbClr val="0000FF"/>
-                </a:solidFill>
-                <a:latin typeface="Times New Roman" panose="02020603050405020304" pitchFamily="18" charset="0"/>
-                <a:ea typeface="Calibri" panose="020F0502020204030204" pitchFamily="34" charset="0"/>
-                <a:cs typeface="Times New Roman" panose="02020603050405020304" pitchFamily="18" charset="0"/>
-                <a:hlinkClick r:id="rId5"/>
-              </a:rPr>
-              <a:t>https://www.classgist.com/abstract-generator.aspx</a:t>
-            </a:r>
-            <a:endParaRPr lang="en-US" sz="1400" dirty="0">
-              <a:latin typeface="Times New Roman" panose="02020603050405020304" pitchFamily="18" charset="0"/>
-              <a:ea typeface="Calibri" panose="020F0502020204030204" pitchFamily="34" charset="0"/>
-              <a:cs typeface="Times New Roman" panose="02020603050405020304" pitchFamily="18" charset="0"/>
-            </a:endParaRPr>
-          </a:p>
-          <a:p>
-            <a:pPr marL="342900" lvl="0" indent="-342900" algn="l" rtl="0">
-              <a:lnSpc>
-                <a:spcPct val="150000"/>
-              </a:lnSpc>
-              <a:spcAft>
-                <a:spcPts val="0"/>
-              </a:spcAft>
-              <a:buFont typeface="+mj-lt"/>
-              <a:buAutoNum type="arabicPeriod"/>
-            </a:pPr>
-            <a:r>
-              <a:rPr lang="en-US" sz="1400" u="sng" dirty="0">
-                <a:solidFill>
-                  <a:srgbClr val="0000FF"/>
-                </a:solidFill>
-                <a:latin typeface="Times New Roman" panose="02020603050405020304" pitchFamily="18" charset="0"/>
-                <a:ea typeface="Calibri" panose="020F0502020204030204" pitchFamily="34" charset="0"/>
-                <a:cs typeface="Times New Roman" panose="02020603050405020304" pitchFamily="18" charset="0"/>
-                <a:hlinkClick r:id="rId6"/>
-              </a:rPr>
-              <a:t>https://www.scholarcy.com/what-makes-a-good-abstract/</a:t>
-            </a:r>
-            <a:endParaRPr lang="en-US" sz="1400" dirty="0">
-              <a:latin typeface="Times New Roman" panose="02020603050405020304" pitchFamily="18" charset="0"/>
-              <a:ea typeface="Calibri" panose="020F0502020204030204" pitchFamily="34" charset="0"/>
-              <a:cs typeface="Times New Roman" panose="02020603050405020304" pitchFamily="18" charset="0"/>
-            </a:endParaRPr>
-          </a:p>
-          <a:p>
-            <a:pPr marL="342900" lvl="0" indent="-342900" algn="l" rtl="0">
-              <a:lnSpc>
-                <a:spcPct val="150000"/>
-              </a:lnSpc>
-              <a:spcAft>
-                <a:spcPts val="800"/>
-              </a:spcAft>
-              <a:buFont typeface="+mj-lt"/>
-              <a:buAutoNum type="arabicPeriod"/>
-            </a:pPr>
-            <a:r>
-              <a:rPr lang="en-US" sz="1400" u="sng" dirty="0">
-                <a:solidFill>
-                  <a:srgbClr val="0000FF"/>
-                </a:solidFill>
-                <a:latin typeface="Times New Roman" panose="02020603050405020304" pitchFamily="18" charset="0"/>
-                <a:ea typeface="Calibri" panose="020F0502020204030204" pitchFamily="34" charset="0"/>
-                <a:cs typeface="Times New Roman" panose="02020603050405020304" pitchFamily="18" charset="0"/>
-                <a:hlinkClick r:id="rId7"/>
-              </a:rPr>
-              <a:t>https://assignzen.com/free-writing-tools/abstract-generator/</a:t>
-            </a:r>
-            <a:endParaRPr lang="en-US" sz="1400" dirty="0">
-              <a:latin typeface="Times New Roman" panose="02020603050405020304" pitchFamily="18" charset="0"/>
-              <a:ea typeface="Calibri" panose="020F0502020204030204" pitchFamily="34" charset="0"/>
-              <a:cs typeface="Times New Roman" panose="02020603050405020304" pitchFamily="18" charset="0"/>
-            </a:endParaRPr>
-          </a:p>
-          <a:p>
-            <a:pPr marL="342900" lvl="0" indent="-342900" algn="l" rtl="0">
-              <a:lnSpc>
-                <a:spcPct val="150000"/>
-              </a:lnSpc>
-              <a:spcAft>
-                <a:spcPts val="800"/>
-              </a:spcAft>
-              <a:buFont typeface="+mj-lt"/>
-              <a:buAutoNum type="arabicPeriod"/>
-            </a:pPr>
-            <a:r>
-              <a:rPr lang="en-US" sz="1400" u="sng" dirty="0">
-                <a:solidFill>
-                  <a:srgbClr val="0000FF"/>
-                </a:solidFill>
-                <a:latin typeface="Times New Roman" panose="02020603050405020304" pitchFamily="18" charset="0"/>
-                <a:ea typeface="Calibri" panose="020F0502020204030204" pitchFamily="34" charset="0"/>
-                <a:cs typeface="Times New Roman" panose="02020603050405020304" pitchFamily="18" charset="0"/>
-                <a:hlinkClick r:id="rId8"/>
-              </a:rPr>
-              <a:t>https://www.nelsenso.net/en/abstract-online.aspx</a:t>
-            </a:r>
-            <a:endParaRPr lang="en-US" sz="1400" dirty="0">
-              <a:latin typeface="Times New Roman" panose="02020603050405020304" pitchFamily="18" charset="0"/>
-              <a:cs typeface="Times New Roman" panose="02020603050405020304" pitchFamily="18" charset="0"/>
-            </a:endParaRPr>
-          </a:p>
-        </p:txBody>
-      </p:sp>
-      <p:pic>
-        <p:nvPicPr>
-          <p:cNvPr id="4" name="Picture 3"/>
-          <p:cNvPicPr>
-            <a:picLocks noChangeAspect="1"/>
-          </p:cNvPicPr>
-          <p:nvPr/>
-        </p:nvPicPr>
-        <p:blipFill>
-          <a:blip r:embed="rId9"/>
-          <a:stretch>
-            <a:fillRect/>
-          </a:stretch>
-        </p:blipFill>
-        <p:spPr>
-          <a:xfrm>
-            <a:off x="8665582" y="1749454"/>
-            <a:ext cx="2051221" cy="2051221"/>
-          </a:xfrm>
-          <a:prstGeom prst="rect">
-            <a:avLst/>
-          </a:prstGeom>
-        </p:spPr>
-      </p:pic>
-    </p:spTree>
-    <p:extLst>
-      <p:ext uri="{BB962C8B-B14F-4D97-AF65-F5344CB8AC3E}">
-        <p14:creationId xmlns:p14="http://schemas.microsoft.com/office/powerpoint/2010/main" val="2595252127"/>
-      </p:ext>
-    </p:extLst>
-  </p:cSld>
-  <p:clrMapOvr>
-    <a:masterClrMapping/>
-  </p:clrMapOvr>
-  <mc:AlternateContent xmlns:mc="http://schemas.openxmlformats.org/markup-compatibility/2006" xmlns:p14="http://schemas.microsoft.com/office/powerpoint/2010/main">
-    <mc:Choice Requires="p14">
-      <p:transition p14:dur="0"/>
-    </mc:Choice>
-    <mc:Fallback xmlns="">
-      <p:transition/>
-    </mc:Fallback>
-  </mc:AlternateContent>
-  <p:timing>
-    <p:tnLst>
-      <p:par>
-        <p:cTn id="1" dur="indefinite" restart="never" nodeType="tmRoot"/>
-      </p:par>
-    </p:tnLst>
-  </p:timing>
 </p:sld>
 </file>
 
@@ -47721,21 +49095,6 @@
   <p:clrMapOvr>
     <a:masterClrMapping/>
   </p:clrMapOvr>
-  <mc:AlternateContent xmlns:mc="http://schemas.openxmlformats.org/markup-compatibility/2006" xmlns:p14="http://schemas.microsoft.com/office/powerpoint/2010/main">
-    <mc:Choice Requires="p14">
-      <p:transition p14:dur="0"/>
-    </mc:Choice>
-    <mc:Fallback xmlns="">
-      <p:transition/>
-    </mc:Fallback>
-  </mc:AlternateContent>
-  <p:timing>
-    <p:tnLst>
-      <p:par>
-        <p:cTn id="1" dur="indefinite" restart="never" nodeType="tmRoot"/>
-      </p:par>
-    </p:tnLst>
-  </p:timing>
 </p:sld>
 </file>
 
@@ -48269,13 +49628,6 @@
   <p:clrMapOvr>
     <a:masterClrMapping/>
   </p:clrMapOvr>
-  <p:timing>
-    <p:tnLst>
-      <p:par>
-        <p:cTn id="1" dur="indefinite" restart="never" nodeType="tmRoot"/>
-      </p:par>
-    </p:tnLst>
-  </p:timing>
 </p:sld>
 </file>
 
@@ -48899,21 +50251,6 @@
   <p:clrMapOvr>
     <a:masterClrMapping/>
   </p:clrMapOvr>
-  <mc:AlternateContent xmlns:mc="http://schemas.openxmlformats.org/markup-compatibility/2006" xmlns:p14="http://schemas.microsoft.com/office/powerpoint/2010/main">
-    <mc:Choice Requires="p14">
-      <p:transition p14:dur="0"/>
-    </mc:Choice>
-    <mc:Fallback xmlns="">
-      <p:transition/>
-    </mc:Fallback>
-  </mc:AlternateContent>
-  <p:timing>
-    <p:tnLst>
-      <p:par>
-        <p:cTn id="1" dur="indefinite" restart="never" nodeType="tmRoot"/>
-      </p:par>
-    </p:tnLst>
-  </p:timing>
 </p:sld>
 </file>
 
@@ -49096,7 +50433,7 @@
         </p:nvSpPr>
         <p:spPr>
           <a:xfrm>
-            <a:off x="1759770" y="2048057"/>
+            <a:off x="1617323" y="2305615"/>
             <a:ext cx="2218294" cy="2246769"/>
           </a:xfrm>
           <a:prstGeom prst="rect">
@@ -49223,8 +50560,8 @@
         </p:nvSpPr>
         <p:spPr>
           <a:xfrm>
-            <a:off x="511995" y="5909804"/>
-            <a:ext cx="7873429" cy="369332"/>
+            <a:off x="511996" y="5909804"/>
+            <a:ext cx="5217752" cy="369332"/>
           </a:xfrm>
           <a:prstGeom prst="rect">
             <a:avLst/>
@@ -49239,7 +50576,7 @@
             <a:pPr algn="l"/>
             <a:r>
               <a:rPr lang="en-US" dirty="0"/>
-              <a:t>https://github.com/genakogan/computer_vision_in_the_age_of_deep_learning</a:t>
+              <a:t>https://github.com/genakogan/information-retrieval</a:t>
             </a:r>
           </a:p>
         </p:txBody>
@@ -49336,42 +50673,71 @@
           </a:p>
         </p:txBody>
       </p:sp>
-      <p:pic>
-        <p:nvPicPr>
-          <p:cNvPr id="10" name="Picture 9" descr="A picture containing text&#10;&#10;Description automatically generated">
+      <p:sp>
+        <p:nvSpPr>
+          <p:cNvPr id="9" name="TextBox 8">
             <a:extLst>
               <a:ext uri="{FF2B5EF4-FFF2-40B4-BE49-F238E27FC236}">
-                <a16:creationId xmlns:a16="http://schemas.microsoft.com/office/drawing/2014/main" id="{DEEA432F-5B09-B4F9-4EA8-4D346D0CC8B1}"/>
+                <a16:creationId xmlns:a16="http://schemas.microsoft.com/office/drawing/2014/main" id="{BA1D9A6B-D3F2-8AC6-CC22-0DA0F5DDACBF}"/>
               </a:ext>
             </a:extLst>
           </p:cNvPr>
-          <p:cNvPicPr>
-            <a:picLocks noChangeAspect="1"/>
-          </p:cNvPicPr>
+          <p:cNvSpPr txBox="1"/>
           <p:nvPr/>
-        </p:nvPicPr>
-        <p:blipFill>
-          <a:blip r:embed="rId2" cstate="print">
-            <a:extLst>
-              <a:ext uri="{28A0092B-C50C-407E-A947-70E740481C1C}">
-                <a14:useLocalDpi xmlns:a14="http://schemas.microsoft.com/office/drawing/2010/main" val="0"/>
-              </a:ext>
-            </a:extLst>
-          </a:blip>
-          <a:stretch>
-            <a:fillRect/>
-          </a:stretch>
-        </p:blipFill>
+        </p:nvSpPr>
         <p:spPr>
           <a:xfrm>
-            <a:off x="5298967" y="3476983"/>
-            <a:ext cx="1531937" cy="1531937"/>
+            <a:off x="4550227" y="3193038"/>
+            <a:ext cx="3091543" cy="1815882"/>
           </a:xfrm>
           <a:prstGeom prst="rect">
             <a:avLst/>
           </a:prstGeom>
+          <a:noFill/>
         </p:spPr>
-      </p:pic>
+        <p:txBody>
+          <a:bodyPr wrap="square">
+            <a:spAutoFit/>
+          </a:bodyPr>
+          <a:lstStyle/>
+          <a:p>
+            <a:pPr marL="285750" indent="-285750" algn="just" rtl="0">
+              <a:buFont typeface="Arial" panose="020B0604020202020204" pitchFamily="34" charset="0"/>
+              <a:buChar char="•"/>
+            </a:pPr>
+            <a:r>
+              <a:rPr lang="en-US" sz="1400" dirty="0"/>
+              <a:t>Selecting 10 (see slide 14) journals belong to the fields of computer and education study. In this journals researches using.</a:t>
+            </a:r>
+          </a:p>
+          <a:p>
+            <a:pPr marL="285750" indent="-285750" algn="just" rtl="0">
+              <a:buFont typeface="Arial" panose="020B0604020202020204" pitchFamily="34" charset="0"/>
+              <a:buChar char="•"/>
+            </a:pPr>
+            <a:r>
+              <a:rPr lang="en-US" sz="1400" dirty="0"/>
+              <a:t>The </a:t>
+            </a:r>
+            <a:r>
+              <a:rPr lang="en-US" sz="1400" b="1" dirty="0"/>
+              <a:t>Technology Acceptance Model</a:t>
+            </a:r>
+            <a:r>
+              <a:rPr lang="en-US" sz="1400" dirty="0"/>
+              <a:t> (</a:t>
+            </a:r>
+            <a:r>
+              <a:rPr lang="en-US" sz="1400" b="1" dirty="0"/>
+              <a:t>TAM</a:t>
+            </a:r>
+            <a:r>
+              <a:rPr lang="en-US" sz="1400" dirty="0"/>
+              <a:t>) is an information system theory that models how users come to accept and use a technology.</a:t>
+            </a:r>
+          </a:p>
+        </p:txBody>
+      </p:sp>
     </p:spTree>
     <p:extLst>
       <p:ext uri="{BB962C8B-B14F-4D97-AF65-F5344CB8AC3E}">
@@ -49390,13 +50756,6 @@
       <p:transition/>
     </mc:Fallback>
   </mc:AlternateContent>
-  <p:timing>
-    <p:tnLst>
-      <p:par>
-        <p:cTn id="1" dur="indefinite" restart="never" nodeType="tmRoot"/>
-      </p:par>
-    </p:tnLst>
-  </p:timing>
 </p:sld>
 </file>
 

</xml_diff>